<commit_message>
More guilt-trip in my defence
</commit_message>
<xml_diff>
--- a/Explanation.pptx
+++ b/Explanation.pptx
@@ -43,7 +43,7 @@
       </p:grpSpPr>
       <p:sp>
         <p:nvSpPr>
-          <p:cNvPr id="80" name="PlaceHolder 1"/>
+          <p:cNvPr id="77" name="PlaceHolder 1"/>
           <p:cNvSpPr>
             <a:spLocks noGrp="1"/>
           </p:cNvSpPr>
@@ -65,27 +65,22 @@
             <a:noAutofit/>
           </a:bodyPr>
           <a:p>
+            <a:pPr algn="ctr"/>
             <a:r>
-              <a:rPr b="0" lang="en-IN" sz="1400" spc="-1" strike="noStrike">
-                <a:solidFill>
-                  <a:srgbClr val="000000"/>
-                </a:solidFill>
+              <a:rPr b="0" lang="en-IN" sz="4400" spc="-1" strike="noStrike">
                 <a:latin typeface="Arial"/>
               </a:rPr>
               <a:t>Click to move the slide</a:t>
             </a:r>
-            <a:endParaRPr b="0" lang="en-IN" sz="1400" spc="-1" strike="noStrike">
-              <a:solidFill>
-                <a:srgbClr val="000000"/>
-              </a:solidFill>
-              <a:latin typeface="Arial"/>
-            </a:endParaRPr>
-          </a:p>
-        </p:txBody>
-      </p:sp>
-      <p:sp>
-        <p:nvSpPr>
-          <p:cNvPr id="81" name="PlaceHolder 2"/>
+            <a:endParaRPr b="0" lang="en-IN" sz="4400" spc="-1" strike="noStrike">
+              <a:latin typeface="Arial"/>
+            </a:endParaRPr>
+          </a:p>
+        </p:txBody>
+      </p:sp>
+      <p:sp>
+        <p:nvSpPr>
+          <p:cNvPr id="78" name="PlaceHolder 2"/>
           <p:cNvSpPr>
             <a:spLocks noGrp="1"/>
           </p:cNvSpPr>
@@ -121,7 +116,7 @@
       </p:sp>
       <p:sp>
         <p:nvSpPr>
-          <p:cNvPr id="82" name="PlaceHolder 3"/>
+          <p:cNvPr id="79" name="PlaceHolder 3"/>
           <p:cNvSpPr>
             <a:spLocks noGrp="1"/>
           </p:cNvSpPr>
@@ -157,7 +152,7 @@
       </p:sp>
       <p:sp>
         <p:nvSpPr>
-          <p:cNvPr id="83" name="PlaceHolder 4"/>
+          <p:cNvPr id="80" name="PlaceHolder 4"/>
           <p:cNvSpPr>
             <a:spLocks noGrp="1"/>
           </p:cNvSpPr>
@@ -194,7 +189,7 @@
       </p:sp>
       <p:sp>
         <p:nvSpPr>
-          <p:cNvPr id="84" name="PlaceHolder 5"/>
+          <p:cNvPr id="81" name="PlaceHolder 5"/>
           <p:cNvSpPr>
             <a:spLocks noGrp="1"/>
           </p:cNvSpPr>
@@ -230,7 +225,7 @@
       </p:sp>
       <p:sp>
         <p:nvSpPr>
-          <p:cNvPr id="85" name="PlaceHolder 6"/>
+          <p:cNvPr id="82" name="PlaceHolder 6"/>
           <p:cNvSpPr>
             <a:spLocks noGrp="1"/>
           </p:cNvSpPr>
@@ -253,7 +248,7 @@
           </a:bodyPr>
           <a:p>
             <a:pPr algn="r"/>
-            <a:fld id="{01B11250-92EE-490A-9658-8D02DB8D118D}" type="slidenum">
+            <a:fld id="{FBE0990E-3FFF-4247-B7DE-0C48A3FAA736}" type="slidenum">
               <a:rPr b="0" lang="en-IN" sz="1400" spc="-1" strike="noStrike">
                 <a:latin typeface="Times New Roman"/>
               </a:rPr>
@@ -290,7 +285,7 @@
       </p:grpSpPr>
       <p:sp>
         <p:nvSpPr>
-          <p:cNvPr id="131" name="PlaceHolder 1"/>
+          <p:cNvPr id="128" name="PlaceHolder 1"/>
           <p:cNvSpPr>
             <a:spLocks noGrp="1"/>
           </p:cNvSpPr>
@@ -301,7 +296,7 @@
         <p:spPr>
           <a:xfrm>
             <a:off x="756000" y="5145120"/>
-            <a:ext cx="6042960" cy="4204800"/>
+            <a:ext cx="6042600" cy="4204440"/>
           </a:xfrm>
           <a:prstGeom prst="rect">
             <a:avLst/>
@@ -320,14 +315,14 @@
       </p:sp>
       <p:sp>
         <p:nvSpPr>
-          <p:cNvPr id="132" name="CustomShape 2"/>
+          <p:cNvPr id="129" name="CustomShape 2"/>
           <p:cNvSpPr/>
           <p:nvPr/>
         </p:nvSpPr>
         <p:spPr>
           <a:xfrm>
             <a:off x="4282200" y="10155240"/>
-            <a:ext cx="3270960" cy="531360"/>
+            <a:ext cx="3270600" cy="531000"/>
           </a:xfrm>
           <a:prstGeom prst="rect">
             <a:avLst/>
@@ -346,7 +341,7 @@
       </p:sp>
       <p:sp>
         <p:nvSpPr>
-          <p:cNvPr id="133" name="PlaceHolder 3"/>
+          <p:cNvPr id="130" name="PlaceHolder 3"/>
           <p:cNvSpPr>
             <a:spLocks noGrp="1"/>
           </p:cNvSpPr>
@@ -357,7 +352,7 @@
         <p:spPr>
           <a:xfrm>
             <a:off x="685800" y="1143000"/>
-            <a:ext cx="5486040" cy="3085920"/>
+            <a:ext cx="5485680" cy="3085560"/>
           </a:xfrm>
           <a:prstGeom prst="rect">
             <a:avLst/>
@@ -432,10 +427,8 @@
             <a:noAutofit/>
           </a:bodyPr>
           <a:p>
-            <a:endParaRPr b="0" lang="en-IN" sz="1400" spc="-1" strike="noStrike">
-              <a:solidFill>
-                <a:srgbClr val="000000"/>
-              </a:solidFill>
+            <a:pPr algn="ctr"/>
+            <a:endParaRPr b="0" lang="en-IN" sz="4400" spc="-1" strike="noStrike">
               <a:latin typeface="Arial"/>
             </a:endParaRPr>
           </a:p>
@@ -465,10 +458,7 @@
             <a:normAutofit/>
           </a:bodyPr>
           <a:p>
-            <a:endParaRPr b="0" lang="en-IN" sz="1400" spc="-1" strike="noStrike">
-              <a:solidFill>
-                <a:srgbClr val="000000"/>
-              </a:solidFill>
+            <a:endParaRPr b="0" lang="en-IN" sz="3200" spc="-1" strike="noStrike">
               <a:latin typeface="Arial"/>
             </a:endParaRPr>
           </a:p>
@@ -498,10 +488,7 @@
             <a:normAutofit/>
           </a:bodyPr>
           <a:p>
-            <a:endParaRPr b="0" lang="en-IN" sz="1400" spc="-1" strike="noStrike">
-              <a:solidFill>
-                <a:srgbClr val="000000"/>
-              </a:solidFill>
+            <a:endParaRPr b="0" lang="en-IN" sz="3200" spc="-1" strike="noStrike">
               <a:latin typeface="Arial"/>
             </a:endParaRPr>
           </a:p>
@@ -553,10 +540,8 @@
             <a:noAutofit/>
           </a:bodyPr>
           <a:p>
-            <a:endParaRPr b="0" lang="en-IN" sz="1400" spc="-1" strike="noStrike">
-              <a:solidFill>
-                <a:srgbClr val="000000"/>
-              </a:solidFill>
+            <a:pPr algn="ctr"/>
+            <a:endParaRPr b="0" lang="en-IN" sz="4400" spc="-1" strike="noStrike">
               <a:latin typeface="Arial"/>
             </a:endParaRPr>
           </a:p>
@@ -586,10 +571,7 @@
             <a:normAutofit/>
           </a:bodyPr>
           <a:p>
-            <a:endParaRPr b="0" lang="en-IN" sz="1400" spc="-1" strike="noStrike">
-              <a:solidFill>
-                <a:srgbClr val="000000"/>
-              </a:solidFill>
+            <a:endParaRPr b="0" lang="en-IN" sz="3200" spc="-1" strike="noStrike">
               <a:latin typeface="Arial"/>
             </a:endParaRPr>
           </a:p>
@@ -619,10 +601,7 @@
             <a:normAutofit/>
           </a:bodyPr>
           <a:p>
-            <a:endParaRPr b="0" lang="en-IN" sz="1400" spc="-1" strike="noStrike">
-              <a:solidFill>
-                <a:srgbClr val="000000"/>
-              </a:solidFill>
+            <a:endParaRPr b="0" lang="en-IN" sz="3200" spc="-1" strike="noStrike">
               <a:latin typeface="Arial"/>
             </a:endParaRPr>
           </a:p>
@@ -652,10 +631,7 @@
             <a:normAutofit/>
           </a:bodyPr>
           <a:p>
-            <a:endParaRPr b="0" lang="en-IN" sz="1400" spc="-1" strike="noStrike">
-              <a:solidFill>
-                <a:srgbClr val="000000"/>
-              </a:solidFill>
+            <a:endParaRPr b="0" lang="en-IN" sz="3200" spc="-1" strike="noStrike">
               <a:latin typeface="Arial"/>
             </a:endParaRPr>
           </a:p>
@@ -685,10 +661,7 @@
             <a:normAutofit/>
           </a:bodyPr>
           <a:p>
-            <a:endParaRPr b="0" lang="en-IN" sz="1400" spc="-1" strike="noStrike">
-              <a:solidFill>
-                <a:srgbClr val="000000"/>
-              </a:solidFill>
+            <a:endParaRPr b="0" lang="en-IN" sz="3200" spc="-1" strike="noStrike">
               <a:latin typeface="Arial"/>
             </a:endParaRPr>
           </a:p>
@@ -740,10 +713,8 @@
             <a:noAutofit/>
           </a:bodyPr>
           <a:p>
-            <a:endParaRPr b="0" lang="en-IN" sz="1400" spc="-1" strike="noStrike">
-              <a:solidFill>
-                <a:srgbClr val="000000"/>
-              </a:solidFill>
+            <a:pPr algn="ctr"/>
+            <a:endParaRPr b="0" lang="en-IN" sz="4400" spc="-1" strike="noStrike">
               <a:latin typeface="Arial"/>
             </a:endParaRPr>
           </a:p>
@@ -773,10 +744,7 @@
             <a:normAutofit/>
           </a:bodyPr>
           <a:p>
-            <a:endParaRPr b="0" lang="en-IN" sz="1400" spc="-1" strike="noStrike">
-              <a:solidFill>
-                <a:srgbClr val="000000"/>
-              </a:solidFill>
+            <a:endParaRPr b="0" lang="en-IN" sz="3200" spc="-1" strike="noStrike">
               <a:latin typeface="Arial"/>
             </a:endParaRPr>
           </a:p>
@@ -806,10 +774,7 @@
             <a:normAutofit/>
           </a:bodyPr>
           <a:p>
-            <a:endParaRPr b="0" lang="en-IN" sz="1400" spc="-1" strike="noStrike">
-              <a:solidFill>
-                <a:srgbClr val="000000"/>
-              </a:solidFill>
+            <a:endParaRPr b="0" lang="en-IN" sz="3200" spc="-1" strike="noStrike">
               <a:latin typeface="Arial"/>
             </a:endParaRPr>
           </a:p>
@@ -839,10 +804,7 @@
             <a:normAutofit/>
           </a:bodyPr>
           <a:p>
-            <a:endParaRPr b="0" lang="en-IN" sz="1400" spc="-1" strike="noStrike">
-              <a:solidFill>
-                <a:srgbClr val="000000"/>
-              </a:solidFill>
+            <a:endParaRPr b="0" lang="en-IN" sz="3200" spc="-1" strike="noStrike">
               <a:latin typeface="Arial"/>
             </a:endParaRPr>
           </a:p>
@@ -872,10 +834,7 @@
             <a:normAutofit/>
           </a:bodyPr>
           <a:p>
-            <a:endParaRPr b="0" lang="en-IN" sz="1400" spc="-1" strike="noStrike">
-              <a:solidFill>
-                <a:srgbClr val="000000"/>
-              </a:solidFill>
+            <a:endParaRPr b="0" lang="en-IN" sz="3200" spc="-1" strike="noStrike">
               <a:latin typeface="Arial"/>
             </a:endParaRPr>
           </a:p>
@@ -905,10 +864,7 @@
             <a:normAutofit/>
           </a:bodyPr>
           <a:p>
-            <a:endParaRPr b="0" lang="en-IN" sz="1400" spc="-1" strike="noStrike">
-              <a:solidFill>
-                <a:srgbClr val="000000"/>
-              </a:solidFill>
+            <a:endParaRPr b="0" lang="en-IN" sz="3200" spc="-1" strike="noStrike">
               <a:latin typeface="Arial"/>
             </a:endParaRPr>
           </a:p>
@@ -938,10 +894,7 @@
             <a:normAutofit/>
           </a:bodyPr>
           <a:p>
-            <a:endParaRPr b="0" lang="en-IN" sz="1400" spc="-1" strike="noStrike">
-              <a:solidFill>
-                <a:srgbClr val="000000"/>
-              </a:solidFill>
+            <a:endParaRPr b="0" lang="en-IN" sz="3200" spc="-1" strike="noStrike">
               <a:latin typeface="Arial"/>
             </a:endParaRPr>
           </a:p>
@@ -993,7 +946,7 @@
       </p:grpSpPr>
       <p:sp>
         <p:nvSpPr>
-          <p:cNvPr id="44" name="PlaceHolder 1"/>
+          <p:cNvPr id="41" name="PlaceHolder 1"/>
           <p:cNvSpPr>
             <a:spLocks noGrp="1"/>
           </p:cNvSpPr>
@@ -1015,18 +968,16 @@
             <a:noAutofit/>
           </a:bodyPr>
           <a:p>
-            <a:endParaRPr b="0" lang="en-IN" sz="1400" spc="-1" strike="noStrike">
-              <a:solidFill>
-                <a:srgbClr val="000000"/>
-              </a:solidFill>
-              <a:latin typeface="Arial"/>
-            </a:endParaRPr>
-          </a:p>
-        </p:txBody>
-      </p:sp>
-      <p:sp>
-        <p:nvSpPr>
-          <p:cNvPr id="45" name="PlaceHolder 2"/>
+            <a:pPr algn="ctr"/>
+            <a:endParaRPr b="0" lang="en-IN" sz="4400" spc="-1" strike="noStrike">
+              <a:latin typeface="Arial"/>
+            </a:endParaRPr>
+          </a:p>
+        </p:txBody>
+      </p:sp>
+      <p:sp>
+        <p:nvSpPr>
+          <p:cNvPr id="42" name="PlaceHolder 2"/>
           <p:cNvSpPr>
             <a:spLocks noGrp="1"/>
           </p:cNvSpPr>
@@ -1079,7 +1030,7 @@
       </p:grpSpPr>
       <p:sp>
         <p:nvSpPr>
-          <p:cNvPr id="46" name="PlaceHolder 1"/>
+          <p:cNvPr id="43" name="PlaceHolder 1"/>
           <p:cNvSpPr>
             <a:spLocks noGrp="1"/>
           </p:cNvSpPr>
@@ -1101,18 +1052,16 @@
             <a:noAutofit/>
           </a:bodyPr>
           <a:p>
-            <a:endParaRPr b="0" lang="en-IN" sz="1400" spc="-1" strike="noStrike">
-              <a:solidFill>
-                <a:srgbClr val="000000"/>
-              </a:solidFill>
-              <a:latin typeface="Arial"/>
-            </a:endParaRPr>
-          </a:p>
-        </p:txBody>
-      </p:sp>
-      <p:sp>
-        <p:nvSpPr>
-          <p:cNvPr id="47" name="PlaceHolder 2"/>
+            <a:pPr algn="ctr"/>
+            <a:endParaRPr b="0" lang="en-IN" sz="4400" spc="-1" strike="noStrike">
+              <a:latin typeface="Arial"/>
+            </a:endParaRPr>
+          </a:p>
+        </p:txBody>
+      </p:sp>
+      <p:sp>
+        <p:nvSpPr>
+          <p:cNvPr id="44" name="PlaceHolder 2"/>
           <p:cNvSpPr>
             <a:spLocks noGrp="1"/>
           </p:cNvSpPr>
@@ -1134,10 +1083,7 @@
             <a:normAutofit/>
           </a:bodyPr>
           <a:p>
-            <a:endParaRPr b="0" lang="en-IN" sz="1400" spc="-1" strike="noStrike">
-              <a:solidFill>
-                <a:srgbClr val="000000"/>
-              </a:solidFill>
+            <a:endParaRPr b="0" lang="en-IN" sz="3200" spc="-1" strike="noStrike">
               <a:latin typeface="Arial"/>
             </a:endParaRPr>
           </a:p>
@@ -1167,7 +1113,7 @@
       </p:grpSpPr>
       <p:sp>
         <p:nvSpPr>
-          <p:cNvPr id="48" name="PlaceHolder 1"/>
+          <p:cNvPr id="45" name="PlaceHolder 1"/>
           <p:cNvSpPr>
             <a:spLocks noGrp="1"/>
           </p:cNvSpPr>
@@ -1189,18 +1135,16 @@
             <a:noAutofit/>
           </a:bodyPr>
           <a:p>
-            <a:endParaRPr b="0" lang="en-IN" sz="1400" spc="-1" strike="noStrike">
-              <a:solidFill>
-                <a:srgbClr val="000000"/>
-              </a:solidFill>
-              <a:latin typeface="Arial"/>
-            </a:endParaRPr>
-          </a:p>
-        </p:txBody>
-      </p:sp>
-      <p:sp>
-        <p:nvSpPr>
-          <p:cNvPr id="49" name="PlaceHolder 2"/>
+            <a:pPr algn="ctr"/>
+            <a:endParaRPr b="0" lang="en-IN" sz="4400" spc="-1" strike="noStrike">
+              <a:latin typeface="Arial"/>
+            </a:endParaRPr>
+          </a:p>
+        </p:txBody>
+      </p:sp>
+      <p:sp>
+        <p:nvSpPr>
+          <p:cNvPr id="46" name="PlaceHolder 2"/>
           <p:cNvSpPr>
             <a:spLocks noGrp="1"/>
           </p:cNvSpPr>
@@ -1222,18 +1166,15 @@
             <a:normAutofit/>
           </a:bodyPr>
           <a:p>
-            <a:endParaRPr b="0" lang="en-IN" sz="1400" spc="-1" strike="noStrike">
-              <a:solidFill>
-                <a:srgbClr val="000000"/>
-              </a:solidFill>
-              <a:latin typeface="Arial"/>
-            </a:endParaRPr>
-          </a:p>
-        </p:txBody>
-      </p:sp>
-      <p:sp>
-        <p:nvSpPr>
-          <p:cNvPr id="50" name="PlaceHolder 3"/>
+            <a:endParaRPr b="0" lang="en-IN" sz="3200" spc="-1" strike="noStrike">
+              <a:latin typeface="Arial"/>
+            </a:endParaRPr>
+          </a:p>
+        </p:txBody>
+      </p:sp>
+      <p:sp>
+        <p:nvSpPr>
+          <p:cNvPr id="47" name="PlaceHolder 3"/>
           <p:cNvSpPr>
             <a:spLocks noGrp="1"/>
           </p:cNvSpPr>
@@ -1255,10 +1196,7 @@
             <a:normAutofit/>
           </a:bodyPr>
           <a:p>
-            <a:endParaRPr b="0" lang="en-IN" sz="1400" spc="-1" strike="noStrike">
-              <a:solidFill>
-                <a:srgbClr val="000000"/>
-              </a:solidFill>
+            <a:endParaRPr b="0" lang="en-IN" sz="3200" spc="-1" strike="noStrike">
               <a:latin typeface="Arial"/>
             </a:endParaRPr>
           </a:p>
@@ -1288,7 +1226,7 @@
       </p:grpSpPr>
       <p:sp>
         <p:nvSpPr>
-          <p:cNvPr id="51" name="PlaceHolder 1"/>
+          <p:cNvPr id="48" name="PlaceHolder 1"/>
           <p:cNvSpPr>
             <a:spLocks noGrp="1"/>
           </p:cNvSpPr>
@@ -1310,10 +1248,8 @@
             <a:noAutofit/>
           </a:bodyPr>
           <a:p>
-            <a:endParaRPr b="0" lang="en-IN" sz="1400" spc="-1" strike="noStrike">
-              <a:solidFill>
-                <a:srgbClr val="000000"/>
-              </a:solidFill>
+            <a:pPr algn="ctr"/>
+            <a:endParaRPr b="0" lang="en-IN" sz="4400" spc="-1" strike="noStrike">
               <a:latin typeface="Arial"/>
             </a:endParaRPr>
           </a:p>
@@ -1343,7 +1279,7 @@
       </p:grpSpPr>
       <p:sp>
         <p:nvSpPr>
-          <p:cNvPr id="52" name="PlaceHolder 1"/>
+          <p:cNvPr id="49" name="PlaceHolder 1"/>
           <p:cNvSpPr>
             <a:spLocks noGrp="1"/>
           </p:cNvSpPr>
@@ -1396,7 +1332,7 @@
       </p:grpSpPr>
       <p:sp>
         <p:nvSpPr>
-          <p:cNvPr id="53" name="PlaceHolder 1"/>
+          <p:cNvPr id="50" name="PlaceHolder 1"/>
           <p:cNvSpPr>
             <a:spLocks noGrp="1"/>
           </p:cNvSpPr>
@@ -1418,18 +1354,16 @@
             <a:noAutofit/>
           </a:bodyPr>
           <a:p>
-            <a:endParaRPr b="0" lang="en-IN" sz="1400" spc="-1" strike="noStrike">
-              <a:solidFill>
-                <a:srgbClr val="000000"/>
-              </a:solidFill>
-              <a:latin typeface="Arial"/>
-            </a:endParaRPr>
-          </a:p>
-        </p:txBody>
-      </p:sp>
-      <p:sp>
-        <p:nvSpPr>
-          <p:cNvPr id="54" name="PlaceHolder 2"/>
+            <a:pPr algn="ctr"/>
+            <a:endParaRPr b="0" lang="en-IN" sz="4400" spc="-1" strike="noStrike">
+              <a:latin typeface="Arial"/>
+            </a:endParaRPr>
+          </a:p>
+        </p:txBody>
+      </p:sp>
+      <p:sp>
+        <p:nvSpPr>
+          <p:cNvPr id="51" name="PlaceHolder 2"/>
           <p:cNvSpPr>
             <a:spLocks noGrp="1"/>
           </p:cNvSpPr>
@@ -1451,18 +1385,15 @@
             <a:normAutofit/>
           </a:bodyPr>
           <a:p>
-            <a:endParaRPr b="0" lang="en-IN" sz="1400" spc="-1" strike="noStrike">
-              <a:solidFill>
-                <a:srgbClr val="000000"/>
-              </a:solidFill>
-              <a:latin typeface="Arial"/>
-            </a:endParaRPr>
-          </a:p>
-        </p:txBody>
-      </p:sp>
-      <p:sp>
-        <p:nvSpPr>
-          <p:cNvPr id="55" name="PlaceHolder 3"/>
+            <a:endParaRPr b="0" lang="en-IN" sz="3200" spc="-1" strike="noStrike">
+              <a:latin typeface="Arial"/>
+            </a:endParaRPr>
+          </a:p>
+        </p:txBody>
+      </p:sp>
+      <p:sp>
+        <p:nvSpPr>
+          <p:cNvPr id="52" name="PlaceHolder 3"/>
           <p:cNvSpPr>
             <a:spLocks noGrp="1"/>
           </p:cNvSpPr>
@@ -1484,18 +1415,15 @@
             <a:normAutofit/>
           </a:bodyPr>
           <a:p>
-            <a:endParaRPr b="0" lang="en-IN" sz="1400" spc="-1" strike="noStrike">
-              <a:solidFill>
-                <a:srgbClr val="000000"/>
-              </a:solidFill>
-              <a:latin typeface="Arial"/>
-            </a:endParaRPr>
-          </a:p>
-        </p:txBody>
-      </p:sp>
-      <p:sp>
-        <p:nvSpPr>
-          <p:cNvPr id="56" name="PlaceHolder 4"/>
+            <a:endParaRPr b="0" lang="en-IN" sz="3200" spc="-1" strike="noStrike">
+              <a:latin typeface="Arial"/>
+            </a:endParaRPr>
+          </a:p>
+        </p:txBody>
+      </p:sp>
+      <p:sp>
+        <p:nvSpPr>
+          <p:cNvPr id="53" name="PlaceHolder 4"/>
           <p:cNvSpPr>
             <a:spLocks noGrp="1"/>
           </p:cNvSpPr>
@@ -1517,10 +1445,7 @@
             <a:normAutofit/>
           </a:bodyPr>
           <a:p>
-            <a:endParaRPr b="0" lang="en-IN" sz="1400" spc="-1" strike="noStrike">
-              <a:solidFill>
-                <a:srgbClr val="000000"/>
-              </a:solidFill>
+            <a:endParaRPr b="0" lang="en-IN" sz="3200" spc="-1" strike="noStrike">
               <a:latin typeface="Arial"/>
             </a:endParaRPr>
           </a:p>
@@ -1572,10 +1497,8 @@
             <a:noAutofit/>
           </a:bodyPr>
           <a:p>
-            <a:endParaRPr b="0" lang="en-IN" sz="1400" spc="-1" strike="noStrike">
-              <a:solidFill>
-                <a:srgbClr val="000000"/>
-              </a:solidFill>
+            <a:pPr algn="ctr"/>
+            <a:endParaRPr b="0" lang="en-IN" sz="4400" spc="-1" strike="noStrike">
               <a:latin typeface="Arial"/>
             </a:endParaRPr>
           </a:p>
@@ -1636,7 +1559,7 @@
       </p:grpSpPr>
       <p:sp>
         <p:nvSpPr>
-          <p:cNvPr id="57" name="PlaceHolder 1"/>
+          <p:cNvPr id="54" name="PlaceHolder 1"/>
           <p:cNvSpPr>
             <a:spLocks noGrp="1"/>
           </p:cNvSpPr>
@@ -1658,18 +1581,16 @@
             <a:noAutofit/>
           </a:bodyPr>
           <a:p>
-            <a:endParaRPr b="0" lang="en-IN" sz="1400" spc="-1" strike="noStrike">
-              <a:solidFill>
-                <a:srgbClr val="000000"/>
-              </a:solidFill>
-              <a:latin typeface="Arial"/>
-            </a:endParaRPr>
-          </a:p>
-        </p:txBody>
-      </p:sp>
-      <p:sp>
-        <p:nvSpPr>
-          <p:cNvPr id="58" name="PlaceHolder 2"/>
+            <a:pPr algn="ctr"/>
+            <a:endParaRPr b="0" lang="en-IN" sz="4400" spc="-1" strike="noStrike">
+              <a:latin typeface="Arial"/>
+            </a:endParaRPr>
+          </a:p>
+        </p:txBody>
+      </p:sp>
+      <p:sp>
+        <p:nvSpPr>
+          <p:cNvPr id="55" name="PlaceHolder 2"/>
           <p:cNvSpPr>
             <a:spLocks noGrp="1"/>
           </p:cNvSpPr>
@@ -1691,18 +1612,15 @@
             <a:normAutofit/>
           </a:bodyPr>
           <a:p>
-            <a:endParaRPr b="0" lang="en-IN" sz="1400" spc="-1" strike="noStrike">
-              <a:solidFill>
-                <a:srgbClr val="000000"/>
-              </a:solidFill>
-              <a:latin typeface="Arial"/>
-            </a:endParaRPr>
-          </a:p>
-        </p:txBody>
-      </p:sp>
-      <p:sp>
-        <p:nvSpPr>
-          <p:cNvPr id="59" name="PlaceHolder 3"/>
+            <a:endParaRPr b="0" lang="en-IN" sz="3200" spc="-1" strike="noStrike">
+              <a:latin typeface="Arial"/>
+            </a:endParaRPr>
+          </a:p>
+        </p:txBody>
+      </p:sp>
+      <p:sp>
+        <p:nvSpPr>
+          <p:cNvPr id="56" name="PlaceHolder 3"/>
           <p:cNvSpPr>
             <a:spLocks noGrp="1"/>
           </p:cNvSpPr>
@@ -1724,18 +1642,15 @@
             <a:normAutofit/>
           </a:bodyPr>
           <a:p>
-            <a:endParaRPr b="0" lang="en-IN" sz="1400" spc="-1" strike="noStrike">
-              <a:solidFill>
-                <a:srgbClr val="000000"/>
-              </a:solidFill>
-              <a:latin typeface="Arial"/>
-            </a:endParaRPr>
-          </a:p>
-        </p:txBody>
-      </p:sp>
-      <p:sp>
-        <p:nvSpPr>
-          <p:cNvPr id="60" name="PlaceHolder 4"/>
+            <a:endParaRPr b="0" lang="en-IN" sz="3200" spc="-1" strike="noStrike">
+              <a:latin typeface="Arial"/>
+            </a:endParaRPr>
+          </a:p>
+        </p:txBody>
+      </p:sp>
+      <p:sp>
+        <p:nvSpPr>
+          <p:cNvPr id="57" name="PlaceHolder 4"/>
           <p:cNvSpPr>
             <a:spLocks noGrp="1"/>
           </p:cNvSpPr>
@@ -1757,10 +1672,7 @@
             <a:normAutofit/>
           </a:bodyPr>
           <a:p>
-            <a:endParaRPr b="0" lang="en-IN" sz="1400" spc="-1" strike="noStrike">
-              <a:solidFill>
-                <a:srgbClr val="000000"/>
-              </a:solidFill>
+            <a:endParaRPr b="0" lang="en-IN" sz="3200" spc="-1" strike="noStrike">
               <a:latin typeface="Arial"/>
             </a:endParaRPr>
           </a:p>
@@ -1790,7 +1702,7 @@
       </p:grpSpPr>
       <p:sp>
         <p:nvSpPr>
-          <p:cNvPr id="61" name="PlaceHolder 1"/>
+          <p:cNvPr id="58" name="PlaceHolder 1"/>
           <p:cNvSpPr>
             <a:spLocks noGrp="1"/>
           </p:cNvSpPr>
@@ -1812,18 +1724,16 @@
             <a:noAutofit/>
           </a:bodyPr>
           <a:p>
-            <a:endParaRPr b="0" lang="en-IN" sz="1400" spc="-1" strike="noStrike">
-              <a:solidFill>
-                <a:srgbClr val="000000"/>
-              </a:solidFill>
-              <a:latin typeface="Arial"/>
-            </a:endParaRPr>
-          </a:p>
-        </p:txBody>
-      </p:sp>
-      <p:sp>
-        <p:nvSpPr>
-          <p:cNvPr id="62" name="PlaceHolder 2"/>
+            <a:pPr algn="ctr"/>
+            <a:endParaRPr b="0" lang="en-IN" sz="4400" spc="-1" strike="noStrike">
+              <a:latin typeface="Arial"/>
+            </a:endParaRPr>
+          </a:p>
+        </p:txBody>
+      </p:sp>
+      <p:sp>
+        <p:nvSpPr>
+          <p:cNvPr id="59" name="PlaceHolder 2"/>
           <p:cNvSpPr>
             <a:spLocks noGrp="1"/>
           </p:cNvSpPr>
@@ -1845,18 +1755,15 @@
             <a:normAutofit/>
           </a:bodyPr>
           <a:p>
-            <a:endParaRPr b="0" lang="en-IN" sz="1400" spc="-1" strike="noStrike">
-              <a:solidFill>
-                <a:srgbClr val="000000"/>
-              </a:solidFill>
-              <a:latin typeface="Arial"/>
-            </a:endParaRPr>
-          </a:p>
-        </p:txBody>
-      </p:sp>
-      <p:sp>
-        <p:nvSpPr>
-          <p:cNvPr id="63" name="PlaceHolder 3"/>
+            <a:endParaRPr b="0" lang="en-IN" sz="3200" spc="-1" strike="noStrike">
+              <a:latin typeface="Arial"/>
+            </a:endParaRPr>
+          </a:p>
+        </p:txBody>
+      </p:sp>
+      <p:sp>
+        <p:nvSpPr>
+          <p:cNvPr id="60" name="PlaceHolder 3"/>
           <p:cNvSpPr>
             <a:spLocks noGrp="1"/>
           </p:cNvSpPr>
@@ -1878,18 +1785,15 @@
             <a:normAutofit/>
           </a:bodyPr>
           <a:p>
-            <a:endParaRPr b="0" lang="en-IN" sz="1400" spc="-1" strike="noStrike">
-              <a:solidFill>
-                <a:srgbClr val="000000"/>
-              </a:solidFill>
-              <a:latin typeface="Arial"/>
-            </a:endParaRPr>
-          </a:p>
-        </p:txBody>
-      </p:sp>
-      <p:sp>
-        <p:nvSpPr>
-          <p:cNvPr id="64" name="PlaceHolder 4"/>
+            <a:endParaRPr b="0" lang="en-IN" sz="3200" spc="-1" strike="noStrike">
+              <a:latin typeface="Arial"/>
+            </a:endParaRPr>
+          </a:p>
+        </p:txBody>
+      </p:sp>
+      <p:sp>
+        <p:nvSpPr>
+          <p:cNvPr id="61" name="PlaceHolder 4"/>
           <p:cNvSpPr>
             <a:spLocks noGrp="1"/>
           </p:cNvSpPr>
@@ -1911,10 +1815,7 @@
             <a:normAutofit/>
           </a:bodyPr>
           <a:p>
-            <a:endParaRPr b="0" lang="en-IN" sz="1400" spc="-1" strike="noStrike">
-              <a:solidFill>
-                <a:srgbClr val="000000"/>
-              </a:solidFill>
+            <a:endParaRPr b="0" lang="en-IN" sz="3200" spc="-1" strike="noStrike">
               <a:latin typeface="Arial"/>
             </a:endParaRPr>
           </a:p>
@@ -1944,7 +1845,7 @@
       </p:grpSpPr>
       <p:sp>
         <p:nvSpPr>
-          <p:cNvPr id="65" name="PlaceHolder 1"/>
+          <p:cNvPr id="62" name="PlaceHolder 1"/>
           <p:cNvSpPr>
             <a:spLocks noGrp="1"/>
           </p:cNvSpPr>
@@ -1966,18 +1867,16 @@
             <a:noAutofit/>
           </a:bodyPr>
           <a:p>
-            <a:endParaRPr b="0" lang="en-IN" sz="1400" spc="-1" strike="noStrike">
-              <a:solidFill>
-                <a:srgbClr val="000000"/>
-              </a:solidFill>
-              <a:latin typeface="Arial"/>
-            </a:endParaRPr>
-          </a:p>
-        </p:txBody>
-      </p:sp>
-      <p:sp>
-        <p:nvSpPr>
-          <p:cNvPr id="66" name="PlaceHolder 2"/>
+            <a:pPr algn="ctr"/>
+            <a:endParaRPr b="0" lang="en-IN" sz="4400" spc="-1" strike="noStrike">
+              <a:latin typeface="Arial"/>
+            </a:endParaRPr>
+          </a:p>
+        </p:txBody>
+      </p:sp>
+      <p:sp>
+        <p:nvSpPr>
+          <p:cNvPr id="63" name="PlaceHolder 2"/>
           <p:cNvSpPr>
             <a:spLocks noGrp="1"/>
           </p:cNvSpPr>
@@ -1999,18 +1898,15 @@
             <a:normAutofit/>
           </a:bodyPr>
           <a:p>
-            <a:endParaRPr b="0" lang="en-IN" sz="1400" spc="-1" strike="noStrike">
-              <a:solidFill>
-                <a:srgbClr val="000000"/>
-              </a:solidFill>
-              <a:latin typeface="Arial"/>
-            </a:endParaRPr>
-          </a:p>
-        </p:txBody>
-      </p:sp>
-      <p:sp>
-        <p:nvSpPr>
-          <p:cNvPr id="67" name="PlaceHolder 3"/>
+            <a:endParaRPr b="0" lang="en-IN" sz="3200" spc="-1" strike="noStrike">
+              <a:latin typeface="Arial"/>
+            </a:endParaRPr>
+          </a:p>
+        </p:txBody>
+      </p:sp>
+      <p:sp>
+        <p:nvSpPr>
+          <p:cNvPr id="64" name="PlaceHolder 3"/>
           <p:cNvSpPr>
             <a:spLocks noGrp="1"/>
           </p:cNvSpPr>
@@ -2032,10 +1928,7 @@
             <a:normAutofit/>
           </a:bodyPr>
           <a:p>
-            <a:endParaRPr b="0" lang="en-IN" sz="1400" spc="-1" strike="noStrike">
-              <a:solidFill>
-                <a:srgbClr val="000000"/>
-              </a:solidFill>
+            <a:endParaRPr b="0" lang="en-IN" sz="3200" spc="-1" strike="noStrike">
               <a:latin typeface="Arial"/>
             </a:endParaRPr>
           </a:p>
@@ -2065,7 +1958,7 @@
       </p:grpSpPr>
       <p:sp>
         <p:nvSpPr>
-          <p:cNvPr id="68" name="PlaceHolder 1"/>
+          <p:cNvPr id="65" name="PlaceHolder 1"/>
           <p:cNvSpPr>
             <a:spLocks noGrp="1"/>
           </p:cNvSpPr>
@@ -2087,18 +1980,16 @@
             <a:noAutofit/>
           </a:bodyPr>
           <a:p>
-            <a:endParaRPr b="0" lang="en-IN" sz="1400" spc="-1" strike="noStrike">
-              <a:solidFill>
-                <a:srgbClr val="000000"/>
-              </a:solidFill>
-              <a:latin typeface="Arial"/>
-            </a:endParaRPr>
-          </a:p>
-        </p:txBody>
-      </p:sp>
-      <p:sp>
-        <p:nvSpPr>
-          <p:cNvPr id="69" name="PlaceHolder 2"/>
+            <a:pPr algn="ctr"/>
+            <a:endParaRPr b="0" lang="en-IN" sz="4400" spc="-1" strike="noStrike">
+              <a:latin typeface="Arial"/>
+            </a:endParaRPr>
+          </a:p>
+        </p:txBody>
+      </p:sp>
+      <p:sp>
+        <p:nvSpPr>
+          <p:cNvPr id="66" name="PlaceHolder 2"/>
           <p:cNvSpPr>
             <a:spLocks noGrp="1"/>
           </p:cNvSpPr>
@@ -2120,18 +2011,15 @@
             <a:normAutofit/>
           </a:bodyPr>
           <a:p>
-            <a:endParaRPr b="0" lang="en-IN" sz="1400" spc="-1" strike="noStrike">
-              <a:solidFill>
-                <a:srgbClr val="000000"/>
-              </a:solidFill>
-              <a:latin typeface="Arial"/>
-            </a:endParaRPr>
-          </a:p>
-        </p:txBody>
-      </p:sp>
-      <p:sp>
-        <p:nvSpPr>
-          <p:cNvPr id="70" name="PlaceHolder 3"/>
+            <a:endParaRPr b="0" lang="en-IN" sz="3200" spc="-1" strike="noStrike">
+              <a:latin typeface="Arial"/>
+            </a:endParaRPr>
+          </a:p>
+        </p:txBody>
+      </p:sp>
+      <p:sp>
+        <p:nvSpPr>
+          <p:cNvPr id="67" name="PlaceHolder 3"/>
           <p:cNvSpPr>
             <a:spLocks noGrp="1"/>
           </p:cNvSpPr>
@@ -2153,18 +2041,15 @@
             <a:normAutofit/>
           </a:bodyPr>
           <a:p>
-            <a:endParaRPr b="0" lang="en-IN" sz="1400" spc="-1" strike="noStrike">
-              <a:solidFill>
-                <a:srgbClr val="000000"/>
-              </a:solidFill>
-              <a:latin typeface="Arial"/>
-            </a:endParaRPr>
-          </a:p>
-        </p:txBody>
-      </p:sp>
-      <p:sp>
-        <p:nvSpPr>
-          <p:cNvPr id="71" name="PlaceHolder 4"/>
+            <a:endParaRPr b="0" lang="en-IN" sz="3200" spc="-1" strike="noStrike">
+              <a:latin typeface="Arial"/>
+            </a:endParaRPr>
+          </a:p>
+        </p:txBody>
+      </p:sp>
+      <p:sp>
+        <p:nvSpPr>
+          <p:cNvPr id="68" name="PlaceHolder 4"/>
           <p:cNvSpPr>
             <a:spLocks noGrp="1"/>
           </p:cNvSpPr>
@@ -2186,18 +2071,15 @@
             <a:normAutofit/>
           </a:bodyPr>
           <a:p>
-            <a:endParaRPr b="0" lang="en-IN" sz="1400" spc="-1" strike="noStrike">
-              <a:solidFill>
-                <a:srgbClr val="000000"/>
-              </a:solidFill>
-              <a:latin typeface="Arial"/>
-            </a:endParaRPr>
-          </a:p>
-        </p:txBody>
-      </p:sp>
-      <p:sp>
-        <p:nvSpPr>
-          <p:cNvPr id="72" name="PlaceHolder 5"/>
+            <a:endParaRPr b="0" lang="en-IN" sz="3200" spc="-1" strike="noStrike">
+              <a:latin typeface="Arial"/>
+            </a:endParaRPr>
+          </a:p>
+        </p:txBody>
+      </p:sp>
+      <p:sp>
+        <p:nvSpPr>
+          <p:cNvPr id="69" name="PlaceHolder 5"/>
           <p:cNvSpPr>
             <a:spLocks noGrp="1"/>
           </p:cNvSpPr>
@@ -2219,10 +2101,7 @@
             <a:normAutofit/>
           </a:bodyPr>
           <a:p>
-            <a:endParaRPr b="0" lang="en-IN" sz="1400" spc="-1" strike="noStrike">
-              <a:solidFill>
-                <a:srgbClr val="000000"/>
-              </a:solidFill>
+            <a:endParaRPr b="0" lang="en-IN" sz="3200" spc="-1" strike="noStrike">
               <a:latin typeface="Arial"/>
             </a:endParaRPr>
           </a:p>
@@ -2252,7 +2131,7 @@
       </p:grpSpPr>
       <p:sp>
         <p:nvSpPr>
-          <p:cNvPr id="73" name="PlaceHolder 1"/>
+          <p:cNvPr id="70" name="PlaceHolder 1"/>
           <p:cNvSpPr>
             <a:spLocks noGrp="1"/>
           </p:cNvSpPr>
@@ -2274,18 +2153,16 @@
             <a:noAutofit/>
           </a:bodyPr>
           <a:p>
-            <a:endParaRPr b="0" lang="en-IN" sz="1400" spc="-1" strike="noStrike">
-              <a:solidFill>
-                <a:srgbClr val="000000"/>
-              </a:solidFill>
-              <a:latin typeface="Arial"/>
-            </a:endParaRPr>
-          </a:p>
-        </p:txBody>
-      </p:sp>
-      <p:sp>
-        <p:nvSpPr>
-          <p:cNvPr id="74" name="PlaceHolder 2"/>
+            <a:pPr algn="ctr"/>
+            <a:endParaRPr b="0" lang="en-IN" sz="4400" spc="-1" strike="noStrike">
+              <a:latin typeface="Arial"/>
+            </a:endParaRPr>
+          </a:p>
+        </p:txBody>
+      </p:sp>
+      <p:sp>
+        <p:nvSpPr>
+          <p:cNvPr id="71" name="PlaceHolder 2"/>
           <p:cNvSpPr>
             <a:spLocks noGrp="1"/>
           </p:cNvSpPr>
@@ -2307,18 +2184,15 @@
             <a:normAutofit/>
           </a:bodyPr>
           <a:p>
-            <a:endParaRPr b="0" lang="en-IN" sz="1400" spc="-1" strike="noStrike">
-              <a:solidFill>
-                <a:srgbClr val="000000"/>
-              </a:solidFill>
-              <a:latin typeface="Arial"/>
-            </a:endParaRPr>
-          </a:p>
-        </p:txBody>
-      </p:sp>
-      <p:sp>
-        <p:nvSpPr>
-          <p:cNvPr id="75" name="PlaceHolder 3"/>
+            <a:endParaRPr b="0" lang="en-IN" sz="3200" spc="-1" strike="noStrike">
+              <a:latin typeface="Arial"/>
+            </a:endParaRPr>
+          </a:p>
+        </p:txBody>
+      </p:sp>
+      <p:sp>
+        <p:nvSpPr>
+          <p:cNvPr id="72" name="PlaceHolder 3"/>
           <p:cNvSpPr>
             <a:spLocks noGrp="1"/>
           </p:cNvSpPr>
@@ -2340,18 +2214,15 @@
             <a:normAutofit/>
           </a:bodyPr>
           <a:p>
-            <a:endParaRPr b="0" lang="en-IN" sz="1400" spc="-1" strike="noStrike">
-              <a:solidFill>
-                <a:srgbClr val="000000"/>
-              </a:solidFill>
-              <a:latin typeface="Arial"/>
-            </a:endParaRPr>
-          </a:p>
-        </p:txBody>
-      </p:sp>
-      <p:sp>
-        <p:nvSpPr>
-          <p:cNvPr id="76" name="PlaceHolder 4"/>
+            <a:endParaRPr b="0" lang="en-IN" sz="3200" spc="-1" strike="noStrike">
+              <a:latin typeface="Arial"/>
+            </a:endParaRPr>
+          </a:p>
+        </p:txBody>
+      </p:sp>
+      <p:sp>
+        <p:nvSpPr>
+          <p:cNvPr id="73" name="PlaceHolder 4"/>
           <p:cNvSpPr>
             <a:spLocks noGrp="1"/>
           </p:cNvSpPr>
@@ -2373,18 +2244,15 @@
             <a:normAutofit/>
           </a:bodyPr>
           <a:p>
-            <a:endParaRPr b="0" lang="en-IN" sz="1400" spc="-1" strike="noStrike">
-              <a:solidFill>
-                <a:srgbClr val="000000"/>
-              </a:solidFill>
-              <a:latin typeface="Arial"/>
-            </a:endParaRPr>
-          </a:p>
-        </p:txBody>
-      </p:sp>
-      <p:sp>
-        <p:nvSpPr>
-          <p:cNvPr id="77" name="PlaceHolder 5"/>
+            <a:endParaRPr b="0" lang="en-IN" sz="3200" spc="-1" strike="noStrike">
+              <a:latin typeface="Arial"/>
+            </a:endParaRPr>
+          </a:p>
+        </p:txBody>
+      </p:sp>
+      <p:sp>
+        <p:nvSpPr>
+          <p:cNvPr id="74" name="PlaceHolder 5"/>
           <p:cNvSpPr>
             <a:spLocks noGrp="1"/>
           </p:cNvSpPr>
@@ -2406,18 +2274,15 @@
             <a:normAutofit/>
           </a:bodyPr>
           <a:p>
-            <a:endParaRPr b="0" lang="en-IN" sz="1400" spc="-1" strike="noStrike">
-              <a:solidFill>
-                <a:srgbClr val="000000"/>
-              </a:solidFill>
-              <a:latin typeface="Arial"/>
-            </a:endParaRPr>
-          </a:p>
-        </p:txBody>
-      </p:sp>
-      <p:sp>
-        <p:nvSpPr>
-          <p:cNvPr id="78" name="PlaceHolder 6"/>
+            <a:endParaRPr b="0" lang="en-IN" sz="3200" spc="-1" strike="noStrike">
+              <a:latin typeface="Arial"/>
+            </a:endParaRPr>
+          </a:p>
+        </p:txBody>
+      </p:sp>
+      <p:sp>
+        <p:nvSpPr>
+          <p:cNvPr id="75" name="PlaceHolder 6"/>
           <p:cNvSpPr>
             <a:spLocks noGrp="1"/>
           </p:cNvSpPr>
@@ -2439,18 +2304,15 @@
             <a:normAutofit/>
           </a:bodyPr>
           <a:p>
-            <a:endParaRPr b="0" lang="en-IN" sz="1400" spc="-1" strike="noStrike">
-              <a:solidFill>
-                <a:srgbClr val="000000"/>
-              </a:solidFill>
-              <a:latin typeface="Arial"/>
-            </a:endParaRPr>
-          </a:p>
-        </p:txBody>
-      </p:sp>
-      <p:sp>
-        <p:nvSpPr>
-          <p:cNvPr id="79" name="PlaceHolder 7"/>
+            <a:endParaRPr b="0" lang="en-IN" sz="3200" spc="-1" strike="noStrike">
+              <a:latin typeface="Arial"/>
+            </a:endParaRPr>
+          </a:p>
+        </p:txBody>
+      </p:sp>
+      <p:sp>
+        <p:nvSpPr>
+          <p:cNvPr id="76" name="PlaceHolder 7"/>
           <p:cNvSpPr>
             <a:spLocks noGrp="1"/>
           </p:cNvSpPr>
@@ -2472,10 +2334,7 @@
             <a:normAutofit/>
           </a:bodyPr>
           <a:p>
-            <a:endParaRPr b="0" lang="en-IN" sz="1400" spc="-1" strike="noStrike">
-              <a:solidFill>
-                <a:srgbClr val="000000"/>
-              </a:solidFill>
+            <a:endParaRPr b="0" lang="en-IN" sz="3200" spc="-1" strike="noStrike">
               <a:latin typeface="Arial"/>
             </a:endParaRPr>
           </a:p>
@@ -2527,10 +2386,8 @@
             <a:noAutofit/>
           </a:bodyPr>
           <a:p>
-            <a:endParaRPr b="0" lang="en-IN" sz="1400" spc="-1" strike="noStrike">
-              <a:solidFill>
-                <a:srgbClr val="000000"/>
-              </a:solidFill>
+            <a:pPr algn="ctr"/>
+            <a:endParaRPr b="0" lang="en-IN" sz="4400" spc="-1" strike="noStrike">
               <a:latin typeface="Arial"/>
             </a:endParaRPr>
           </a:p>
@@ -2560,10 +2417,7 @@
             <a:normAutofit/>
           </a:bodyPr>
           <a:p>
-            <a:endParaRPr b="0" lang="en-IN" sz="1400" spc="-1" strike="noStrike">
-              <a:solidFill>
-                <a:srgbClr val="000000"/>
-              </a:solidFill>
+            <a:endParaRPr b="0" lang="en-IN" sz="3200" spc="-1" strike="noStrike">
               <a:latin typeface="Arial"/>
             </a:endParaRPr>
           </a:p>
@@ -2615,10 +2469,8 @@
             <a:noAutofit/>
           </a:bodyPr>
           <a:p>
-            <a:endParaRPr b="0" lang="en-IN" sz="1400" spc="-1" strike="noStrike">
-              <a:solidFill>
-                <a:srgbClr val="000000"/>
-              </a:solidFill>
+            <a:pPr algn="ctr"/>
+            <a:endParaRPr b="0" lang="en-IN" sz="4400" spc="-1" strike="noStrike">
               <a:latin typeface="Arial"/>
             </a:endParaRPr>
           </a:p>
@@ -2648,10 +2500,7 @@
             <a:normAutofit/>
           </a:bodyPr>
           <a:p>
-            <a:endParaRPr b="0" lang="en-IN" sz="1400" spc="-1" strike="noStrike">
-              <a:solidFill>
-                <a:srgbClr val="000000"/>
-              </a:solidFill>
+            <a:endParaRPr b="0" lang="en-IN" sz="3200" spc="-1" strike="noStrike">
               <a:latin typeface="Arial"/>
             </a:endParaRPr>
           </a:p>
@@ -2681,10 +2530,7 @@
             <a:normAutofit/>
           </a:bodyPr>
           <a:p>
-            <a:endParaRPr b="0" lang="en-IN" sz="1400" spc="-1" strike="noStrike">
-              <a:solidFill>
-                <a:srgbClr val="000000"/>
-              </a:solidFill>
+            <a:endParaRPr b="0" lang="en-IN" sz="3200" spc="-1" strike="noStrike">
               <a:latin typeface="Arial"/>
             </a:endParaRPr>
           </a:p>
@@ -2736,10 +2582,8 @@
             <a:noAutofit/>
           </a:bodyPr>
           <a:p>
-            <a:endParaRPr b="0" lang="en-IN" sz="1400" spc="-1" strike="noStrike">
-              <a:solidFill>
-                <a:srgbClr val="000000"/>
-              </a:solidFill>
+            <a:pPr algn="ctr"/>
+            <a:endParaRPr b="0" lang="en-IN" sz="4400" spc="-1" strike="noStrike">
               <a:latin typeface="Arial"/>
             </a:endParaRPr>
           </a:p>
@@ -2844,10 +2688,8 @@
             <a:noAutofit/>
           </a:bodyPr>
           <a:p>
-            <a:endParaRPr b="0" lang="en-IN" sz="1400" spc="-1" strike="noStrike">
-              <a:solidFill>
-                <a:srgbClr val="000000"/>
-              </a:solidFill>
+            <a:pPr algn="ctr"/>
+            <a:endParaRPr b="0" lang="en-IN" sz="4400" spc="-1" strike="noStrike">
               <a:latin typeface="Arial"/>
             </a:endParaRPr>
           </a:p>
@@ -2877,10 +2719,7 @@
             <a:normAutofit/>
           </a:bodyPr>
           <a:p>
-            <a:endParaRPr b="0" lang="en-IN" sz="1400" spc="-1" strike="noStrike">
-              <a:solidFill>
-                <a:srgbClr val="000000"/>
-              </a:solidFill>
+            <a:endParaRPr b="0" lang="en-IN" sz="3200" spc="-1" strike="noStrike">
               <a:latin typeface="Arial"/>
             </a:endParaRPr>
           </a:p>
@@ -2910,10 +2749,7 @@
             <a:normAutofit/>
           </a:bodyPr>
           <a:p>
-            <a:endParaRPr b="0" lang="en-IN" sz="1400" spc="-1" strike="noStrike">
-              <a:solidFill>
-                <a:srgbClr val="000000"/>
-              </a:solidFill>
+            <a:endParaRPr b="0" lang="en-IN" sz="3200" spc="-1" strike="noStrike">
               <a:latin typeface="Arial"/>
             </a:endParaRPr>
           </a:p>
@@ -2943,10 +2779,7 @@
             <a:normAutofit/>
           </a:bodyPr>
           <a:p>
-            <a:endParaRPr b="0" lang="en-IN" sz="1400" spc="-1" strike="noStrike">
-              <a:solidFill>
-                <a:srgbClr val="000000"/>
-              </a:solidFill>
+            <a:endParaRPr b="0" lang="en-IN" sz="3200" spc="-1" strike="noStrike">
               <a:latin typeface="Arial"/>
             </a:endParaRPr>
           </a:p>
@@ -2998,10 +2831,8 @@
             <a:noAutofit/>
           </a:bodyPr>
           <a:p>
-            <a:endParaRPr b="0" lang="en-IN" sz="1400" spc="-1" strike="noStrike">
-              <a:solidFill>
-                <a:srgbClr val="000000"/>
-              </a:solidFill>
+            <a:pPr algn="ctr"/>
+            <a:endParaRPr b="0" lang="en-IN" sz="4400" spc="-1" strike="noStrike">
               <a:latin typeface="Arial"/>
             </a:endParaRPr>
           </a:p>
@@ -3031,10 +2862,7 @@
             <a:normAutofit/>
           </a:bodyPr>
           <a:p>
-            <a:endParaRPr b="0" lang="en-IN" sz="1400" spc="-1" strike="noStrike">
-              <a:solidFill>
-                <a:srgbClr val="000000"/>
-              </a:solidFill>
+            <a:endParaRPr b="0" lang="en-IN" sz="3200" spc="-1" strike="noStrike">
               <a:latin typeface="Arial"/>
             </a:endParaRPr>
           </a:p>
@@ -3064,10 +2892,7 @@
             <a:normAutofit/>
           </a:bodyPr>
           <a:p>
-            <a:endParaRPr b="0" lang="en-IN" sz="1400" spc="-1" strike="noStrike">
-              <a:solidFill>
-                <a:srgbClr val="000000"/>
-              </a:solidFill>
+            <a:endParaRPr b="0" lang="en-IN" sz="3200" spc="-1" strike="noStrike">
               <a:latin typeface="Arial"/>
             </a:endParaRPr>
           </a:p>
@@ -3097,10 +2922,7 @@
             <a:normAutofit/>
           </a:bodyPr>
           <a:p>
-            <a:endParaRPr b="0" lang="en-IN" sz="1400" spc="-1" strike="noStrike">
-              <a:solidFill>
-                <a:srgbClr val="000000"/>
-              </a:solidFill>
+            <a:endParaRPr b="0" lang="en-IN" sz="3200" spc="-1" strike="noStrike">
               <a:latin typeface="Arial"/>
             </a:endParaRPr>
           </a:p>
@@ -3152,10 +2974,8 @@
             <a:noAutofit/>
           </a:bodyPr>
           <a:p>
-            <a:endParaRPr b="0" lang="en-IN" sz="1400" spc="-1" strike="noStrike">
-              <a:solidFill>
-                <a:srgbClr val="000000"/>
-              </a:solidFill>
+            <a:pPr algn="ctr"/>
+            <a:endParaRPr b="0" lang="en-IN" sz="4400" spc="-1" strike="noStrike">
               <a:latin typeface="Arial"/>
             </a:endParaRPr>
           </a:p>
@@ -3185,10 +3005,7 @@
             <a:normAutofit/>
           </a:bodyPr>
           <a:p>
-            <a:endParaRPr b="0" lang="en-IN" sz="1400" spc="-1" strike="noStrike">
-              <a:solidFill>
-                <a:srgbClr val="000000"/>
-              </a:solidFill>
+            <a:endParaRPr b="0" lang="en-IN" sz="3200" spc="-1" strike="noStrike">
               <a:latin typeface="Arial"/>
             </a:endParaRPr>
           </a:p>
@@ -3218,10 +3035,7 @@
             <a:normAutofit/>
           </a:bodyPr>
           <a:p>
-            <a:endParaRPr b="0" lang="en-IN" sz="1400" spc="-1" strike="noStrike">
-              <a:solidFill>
-                <a:srgbClr val="000000"/>
-              </a:solidFill>
+            <a:endParaRPr b="0" lang="en-IN" sz="3200" spc="-1" strike="noStrike">
               <a:latin typeface="Arial"/>
             </a:endParaRPr>
           </a:p>
@@ -3251,10 +3065,7 @@
             <a:normAutofit/>
           </a:bodyPr>
           <a:p>
-            <a:endParaRPr b="0" lang="en-IN" sz="1400" spc="-1" strike="noStrike">
-              <a:solidFill>
-                <a:srgbClr val="000000"/>
-              </a:solidFill>
+            <a:endParaRPr b="0" lang="en-IN" sz="3200" spc="-1" strike="noStrike">
               <a:latin typeface="Arial"/>
             </a:endParaRPr>
           </a:p>
@@ -3302,7 +3113,7 @@
         <p:spPr>
           <a:xfrm>
             <a:off x="360" y="0"/>
-            <a:ext cx="12186000" cy="6853320"/>
+            <a:ext cx="12185640" cy="6852960"/>
           </a:xfrm>
           <a:prstGeom prst="rect">
             <a:avLst/>
@@ -3336,19 +3147,14 @@
             <a:noAutofit/>
           </a:bodyPr>
           <a:p>
+            <a:pPr algn="ctr"/>
             <a:r>
-              <a:rPr b="0" lang="en-IN" sz="1400" spc="-1" strike="noStrike">
-                <a:solidFill>
-                  <a:srgbClr val="000000"/>
-                </a:solidFill>
+              <a:rPr b="0" lang="en-IN" sz="4400" spc="-1" strike="noStrike">
                 <a:latin typeface="Arial"/>
               </a:rPr>
               <a:t>Click to edit the title text format</a:t>
             </a:r>
-            <a:endParaRPr b="0" lang="en-IN" sz="1400" spc="-1" strike="noStrike">
-              <a:solidFill>
-                <a:srgbClr val="000000"/>
-              </a:solidFill>
+            <a:endParaRPr b="0" lang="en-IN" sz="4400" spc="-1" strike="noStrike">
               <a:latin typeface="Arial"/>
             </a:endParaRPr>
           </a:p>
@@ -3390,18 +3196,12 @@
               <a:buChar char=""/>
             </a:pPr>
             <a:r>
-              <a:rPr b="0" lang="en-IN" sz="1400" spc="-1" strike="noStrike">
-                <a:solidFill>
-                  <a:srgbClr val="000000"/>
-                </a:solidFill>
+              <a:rPr b="0" lang="en-IN" sz="3200" spc="-1" strike="noStrike">
                 <a:latin typeface="Arial"/>
               </a:rPr>
               <a:t>Click to edit the outline text format</a:t>
             </a:r>
-            <a:endParaRPr b="0" lang="en-IN" sz="1400" spc="-1" strike="noStrike">
-              <a:solidFill>
-                <a:srgbClr val="000000"/>
-              </a:solidFill>
+            <a:endParaRPr b="0" lang="en-IN" sz="3200" spc="-1" strike="noStrike">
               <a:latin typeface="Arial"/>
             </a:endParaRPr>
           </a:p>
@@ -3418,18 +3218,12 @@
               <a:buChar char=""/>
             </a:pPr>
             <a:r>
-              <a:rPr b="0" lang="en-IN" sz="1400" spc="-1" strike="noStrike">
-                <a:solidFill>
-                  <a:srgbClr val="000000"/>
-                </a:solidFill>
+              <a:rPr b="0" lang="en-IN" sz="2800" spc="-1" strike="noStrike">
                 <a:latin typeface="Arial"/>
               </a:rPr>
               <a:t>Second Outline Level</a:t>
             </a:r>
-            <a:endParaRPr b="0" lang="en-IN" sz="1400" spc="-1" strike="noStrike">
-              <a:solidFill>
-                <a:srgbClr val="000000"/>
-              </a:solidFill>
+            <a:endParaRPr b="0" lang="en-IN" sz="2800" spc="-1" strike="noStrike">
               <a:latin typeface="Arial"/>
             </a:endParaRPr>
           </a:p>
@@ -3446,18 +3240,12 @@
               <a:buChar char=""/>
             </a:pPr>
             <a:r>
-              <a:rPr b="0" lang="en-IN" sz="1400" spc="-1" strike="noStrike">
-                <a:solidFill>
-                  <a:srgbClr val="000000"/>
-                </a:solidFill>
+              <a:rPr b="0" lang="en-IN" sz="2400" spc="-1" strike="noStrike">
                 <a:latin typeface="Arial"/>
               </a:rPr>
               <a:t>Third Outline Level</a:t>
             </a:r>
-            <a:endParaRPr b="0" lang="en-IN" sz="1400" spc="-1" strike="noStrike">
-              <a:solidFill>
-                <a:srgbClr val="000000"/>
-              </a:solidFill>
+            <a:endParaRPr b="0" lang="en-IN" sz="2400" spc="-1" strike="noStrike">
               <a:latin typeface="Arial"/>
             </a:endParaRPr>
           </a:p>
@@ -3474,18 +3262,12 @@
               <a:buChar char=""/>
             </a:pPr>
             <a:r>
-              <a:rPr b="0" lang="en-IN" sz="1400" spc="-1" strike="noStrike">
-                <a:solidFill>
-                  <a:srgbClr val="000000"/>
-                </a:solidFill>
+              <a:rPr b="0" lang="en-IN" sz="2000" spc="-1" strike="noStrike">
                 <a:latin typeface="Arial"/>
               </a:rPr>
               <a:t>Fourth Outline Level</a:t>
             </a:r>
-            <a:endParaRPr b="0" lang="en-IN" sz="1400" spc="-1" strike="noStrike">
-              <a:solidFill>
-                <a:srgbClr val="000000"/>
-              </a:solidFill>
+            <a:endParaRPr b="0" lang="en-IN" sz="2000" spc="-1" strike="noStrike">
               <a:latin typeface="Arial"/>
             </a:endParaRPr>
           </a:p>
@@ -3503,17 +3285,11 @@
             </a:pPr>
             <a:r>
               <a:rPr b="0" lang="en-IN" sz="2000" spc="-1" strike="noStrike">
-                <a:solidFill>
-                  <a:srgbClr val="000000"/>
-                </a:solidFill>
                 <a:latin typeface="Arial"/>
               </a:rPr>
               <a:t>Fifth Outline Level</a:t>
             </a:r>
             <a:endParaRPr b="0" lang="en-IN" sz="2000" spc="-1" strike="noStrike">
-              <a:solidFill>
-                <a:srgbClr val="000000"/>
-              </a:solidFill>
               <a:latin typeface="Arial"/>
             </a:endParaRPr>
           </a:p>
@@ -3531,17 +3307,11 @@
             </a:pPr>
             <a:r>
               <a:rPr b="0" lang="en-IN" sz="2000" spc="-1" strike="noStrike">
-                <a:solidFill>
-                  <a:srgbClr val="000000"/>
-                </a:solidFill>
                 <a:latin typeface="Arial"/>
               </a:rPr>
               <a:t>Sixth Outline Level</a:t>
             </a:r>
             <a:endParaRPr b="0" lang="en-IN" sz="2000" spc="-1" strike="noStrike">
-              <a:solidFill>
-                <a:srgbClr val="000000"/>
-              </a:solidFill>
               <a:latin typeface="Arial"/>
             </a:endParaRPr>
           </a:p>
@@ -3559,17 +3329,11 @@
             </a:pPr>
             <a:r>
               <a:rPr b="0" lang="en-IN" sz="2000" spc="-1" strike="noStrike">
-                <a:solidFill>
-                  <a:srgbClr val="000000"/>
-                </a:solidFill>
                 <a:latin typeface="Arial"/>
               </a:rPr>
               <a:t>Seventh Outline Level</a:t>
             </a:r>
             <a:endParaRPr b="0" lang="en-IN" sz="2000" spc="-1" strike="noStrike">
-              <a:solidFill>
-                <a:srgbClr val="000000"/>
-              </a:solidFill>
               <a:latin typeface="Arial"/>
             </a:endParaRPr>
           </a:p>
@@ -3626,114 +3390,6 @@
             <a:spLocks noGrp="1"/>
           </p:cNvSpPr>
           <p:nvPr>
-            <p:ph type="dt"/>
-          </p:nvPr>
-        </p:nvSpPr>
-        <p:spPr>
-          <a:xfrm>
-            <a:off x="838080" y="6356520"/>
-            <a:ext cx="2742840" cy="364680"/>
-          </a:xfrm>
-          <a:prstGeom prst="rect">
-            <a:avLst/>
-          </a:prstGeom>
-        </p:spPr>
-        <p:txBody>
-          <a:bodyPr anchor="ctr">
-            <a:noAutofit/>
-          </a:bodyPr>
-          <a:p>
-            <a:endParaRPr b="0" lang="en-IN" sz="2400" spc="-1" strike="noStrike">
-              <a:latin typeface="Times New Roman"/>
-            </a:endParaRPr>
-          </a:p>
-        </p:txBody>
-      </p:sp>
-      <p:sp>
-        <p:nvSpPr>
-          <p:cNvPr id="40" name="PlaceHolder 2"/>
-          <p:cNvSpPr>
-            <a:spLocks noGrp="1"/>
-          </p:cNvSpPr>
-          <p:nvPr>
-            <p:ph type="ftr"/>
-          </p:nvPr>
-        </p:nvSpPr>
-        <p:spPr>
-          <a:xfrm>
-            <a:off x="4038480" y="6356520"/>
-            <a:ext cx="4114440" cy="364680"/>
-          </a:xfrm>
-          <a:prstGeom prst="rect">
-            <a:avLst/>
-          </a:prstGeom>
-        </p:spPr>
-        <p:txBody>
-          <a:bodyPr anchor="ctr">
-            <a:noAutofit/>
-          </a:bodyPr>
-          <a:p>
-            <a:endParaRPr b="0" lang="en-IN" sz="2400" spc="-1" strike="noStrike">
-              <a:latin typeface="Times New Roman"/>
-            </a:endParaRPr>
-          </a:p>
-        </p:txBody>
-      </p:sp>
-      <p:sp>
-        <p:nvSpPr>
-          <p:cNvPr id="41" name="PlaceHolder 3"/>
-          <p:cNvSpPr>
-            <a:spLocks noGrp="1"/>
-          </p:cNvSpPr>
-          <p:nvPr>
-            <p:ph type="sldNum"/>
-          </p:nvPr>
-        </p:nvSpPr>
-        <p:spPr>
-          <a:xfrm>
-            <a:off x="8610480" y="6356520"/>
-            <a:ext cx="2742840" cy="364680"/>
-          </a:xfrm>
-          <a:prstGeom prst="rect">
-            <a:avLst/>
-          </a:prstGeom>
-        </p:spPr>
-        <p:txBody>
-          <a:bodyPr anchor="ctr">
-            <a:noAutofit/>
-          </a:bodyPr>
-          <a:p>
-            <a:pPr algn="r">
-              <a:lnSpc>
-                <a:spcPct val="100000"/>
-              </a:lnSpc>
-              <a:tabLst>
-                <a:tab algn="l" pos="0"/>
-              </a:tabLst>
-            </a:pPr>
-            <a:fld id="{13D6C195-C1DD-4573-B39C-583E6374FB5D}" type="slidenum">
-              <a:rPr b="0" lang="en-US" sz="1200" spc="-1" strike="noStrike">
-                <a:solidFill>
-                  <a:srgbClr val="888888"/>
-                </a:solidFill>
-                <a:latin typeface="Calibri"/>
-                <a:ea typeface="Calibri"/>
-              </a:rPr>
-              <a:t>&lt;number&gt;</a:t>
-            </a:fld>
-            <a:endParaRPr b="0" lang="en-IN" sz="1200" spc="-1" strike="noStrike">
-              <a:latin typeface="Times New Roman"/>
-            </a:endParaRPr>
-          </a:p>
-        </p:txBody>
-      </p:sp>
-      <p:sp>
-        <p:nvSpPr>
-          <p:cNvPr id="42" name="PlaceHolder 4"/>
-          <p:cNvSpPr>
-            <a:spLocks noGrp="1"/>
-          </p:cNvSpPr>
-          <p:nvPr>
             <p:ph type="title"/>
           </p:nvPr>
         </p:nvSpPr>
@@ -3751,27 +3407,28 @@
             <a:noAutofit/>
           </a:bodyPr>
           <a:p>
+            <a:pPr algn="ctr"/>
             <a:r>
-              <a:rPr b="0" lang="en-IN" sz="1400" spc="-1" strike="noStrike">
-                <a:solidFill>
-                  <a:srgbClr val="000000"/>
-                </a:solidFill>
+              <a:rPr b="0" lang="en-IN" sz="4400" spc="-1" strike="noStrike">
                 <a:latin typeface="Arial"/>
               </a:rPr>
-              <a:t>Click to edit the title text format</a:t>
+              <a:t>Click to edit the title text </a:t>
             </a:r>
-            <a:endParaRPr b="0" lang="en-IN" sz="1400" spc="-1" strike="noStrike">
-              <a:solidFill>
-                <a:srgbClr val="000000"/>
-              </a:solidFill>
-              <a:latin typeface="Arial"/>
-            </a:endParaRPr>
-          </a:p>
-        </p:txBody>
-      </p:sp>
-      <p:sp>
-        <p:nvSpPr>
-          <p:cNvPr id="43" name="PlaceHolder 5"/>
+            <a:r>
+              <a:rPr b="0" lang="en-IN" sz="4400" spc="-1" strike="noStrike">
+                <a:latin typeface="Arial"/>
+              </a:rPr>
+              <a:t>format</a:t>
+            </a:r>
+            <a:endParaRPr b="0" lang="en-IN" sz="4400" spc="-1" strike="noStrike">
+              <a:latin typeface="Arial"/>
+            </a:endParaRPr>
+          </a:p>
+        </p:txBody>
+      </p:sp>
+      <p:sp>
+        <p:nvSpPr>
+          <p:cNvPr id="40" name="PlaceHolder 2"/>
           <p:cNvSpPr>
             <a:spLocks noGrp="1"/>
           </p:cNvSpPr>
@@ -3805,18 +3462,12 @@
               <a:buChar char=""/>
             </a:pPr>
             <a:r>
-              <a:rPr b="0" lang="en-IN" sz="1400" spc="-1" strike="noStrike">
-                <a:solidFill>
-                  <a:srgbClr val="000000"/>
-                </a:solidFill>
+              <a:rPr b="0" lang="en-IN" sz="3200" spc="-1" strike="noStrike">
                 <a:latin typeface="Arial"/>
               </a:rPr>
               <a:t>Click to edit the outline text format</a:t>
             </a:r>
-            <a:endParaRPr b="0" lang="en-IN" sz="1400" spc="-1" strike="noStrike">
-              <a:solidFill>
-                <a:srgbClr val="000000"/>
-              </a:solidFill>
+            <a:endParaRPr b="0" lang="en-IN" sz="3200" spc="-1" strike="noStrike">
               <a:latin typeface="Arial"/>
             </a:endParaRPr>
           </a:p>
@@ -3833,18 +3484,12 @@
               <a:buChar char=""/>
             </a:pPr>
             <a:r>
-              <a:rPr b="0" lang="en-IN" sz="1400" spc="-1" strike="noStrike">
-                <a:solidFill>
-                  <a:srgbClr val="000000"/>
-                </a:solidFill>
+              <a:rPr b="0" lang="en-IN" sz="2800" spc="-1" strike="noStrike">
                 <a:latin typeface="Arial"/>
               </a:rPr>
               <a:t>Second Outline Level</a:t>
             </a:r>
-            <a:endParaRPr b="0" lang="en-IN" sz="1400" spc="-1" strike="noStrike">
-              <a:solidFill>
-                <a:srgbClr val="000000"/>
-              </a:solidFill>
+            <a:endParaRPr b="0" lang="en-IN" sz="2800" spc="-1" strike="noStrike">
               <a:latin typeface="Arial"/>
             </a:endParaRPr>
           </a:p>
@@ -3861,18 +3506,12 @@
               <a:buChar char=""/>
             </a:pPr>
             <a:r>
-              <a:rPr b="0" lang="en-IN" sz="1400" spc="-1" strike="noStrike">
-                <a:solidFill>
-                  <a:srgbClr val="000000"/>
-                </a:solidFill>
+              <a:rPr b="0" lang="en-IN" sz="2400" spc="-1" strike="noStrike">
                 <a:latin typeface="Arial"/>
               </a:rPr>
               <a:t>Third Outline Level</a:t>
             </a:r>
-            <a:endParaRPr b="0" lang="en-IN" sz="1400" spc="-1" strike="noStrike">
-              <a:solidFill>
-                <a:srgbClr val="000000"/>
-              </a:solidFill>
+            <a:endParaRPr b="0" lang="en-IN" sz="2400" spc="-1" strike="noStrike">
               <a:latin typeface="Arial"/>
             </a:endParaRPr>
           </a:p>
@@ -3889,18 +3528,12 @@
               <a:buChar char=""/>
             </a:pPr>
             <a:r>
-              <a:rPr b="0" lang="en-IN" sz="1400" spc="-1" strike="noStrike">
-                <a:solidFill>
-                  <a:srgbClr val="000000"/>
-                </a:solidFill>
+              <a:rPr b="0" lang="en-IN" sz="2000" spc="-1" strike="noStrike">
                 <a:latin typeface="Arial"/>
               </a:rPr>
               <a:t>Fourth Outline Level</a:t>
             </a:r>
-            <a:endParaRPr b="0" lang="en-IN" sz="1400" spc="-1" strike="noStrike">
-              <a:solidFill>
-                <a:srgbClr val="000000"/>
-              </a:solidFill>
+            <a:endParaRPr b="0" lang="en-IN" sz="2000" spc="-1" strike="noStrike">
               <a:latin typeface="Arial"/>
             </a:endParaRPr>
           </a:p>
@@ -3918,17 +3551,11 @@
             </a:pPr>
             <a:r>
               <a:rPr b="0" lang="en-IN" sz="2000" spc="-1" strike="noStrike">
-                <a:solidFill>
-                  <a:srgbClr val="000000"/>
-                </a:solidFill>
                 <a:latin typeface="Arial"/>
               </a:rPr>
               <a:t>Fifth Outline Level</a:t>
             </a:r>
             <a:endParaRPr b="0" lang="en-IN" sz="2000" spc="-1" strike="noStrike">
-              <a:solidFill>
-                <a:srgbClr val="000000"/>
-              </a:solidFill>
               <a:latin typeface="Arial"/>
             </a:endParaRPr>
           </a:p>
@@ -3946,17 +3573,11 @@
             </a:pPr>
             <a:r>
               <a:rPr b="0" lang="en-IN" sz="2000" spc="-1" strike="noStrike">
-                <a:solidFill>
-                  <a:srgbClr val="000000"/>
-                </a:solidFill>
                 <a:latin typeface="Arial"/>
               </a:rPr>
               <a:t>Sixth Outline Level</a:t>
             </a:r>
             <a:endParaRPr b="0" lang="en-IN" sz="2000" spc="-1" strike="noStrike">
-              <a:solidFill>
-                <a:srgbClr val="000000"/>
-              </a:solidFill>
               <a:latin typeface="Arial"/>
             </a:endParaRPr>
           </a:p>
@@ -3974,17 +3595,11 @@
             </a:pPr>
             <a:r>
               <a:rPr b="0" lang="en-IN" sz="2000" spc="-1" strike="noStrike">
-                <a:solidFill>
-                  <a:srgbClr val="000000"/>
-                </a:solidFill>
                 <a:latin typeface="Arial"/>
               </a:rPr>
               <a:t>Seventh Outline Level</a:t>
             </a:r>
             <a:endParaRPr b="0" lang="en-IN" sz="2000" spc="-1" strike="noStrike">
-              <a:solidFill>
-                <a:srgbClr val="000000"/>
-              </a:solidFill>
               <a:latin typeface="Arial"/>
             </a:endParaRPr>
           </a:p>
@@ -4029,14 +3644,14 @@
       </p:grpSpPr>
       <p:sp>
         <p:nvSpPr>
-          <p:cNvPr id="86" name="CustomShape 1"/>
+          <p:cNvPr id="83" name="CustomShape 1"/>
           <p:cNvSpPr/>
           <p:nvPr/>
         </p:nvSpPr>
         <p:spPr>
           <a:xfrm>
             <a:off x="2698560" y="942840"/>
-            <a:ext cx="6786360" cy="4962600"/>
+            <a:ext cx="6786000" cy="4962240"/>
           </a:xfrm>
           <a:custGeom>
             <a:avLst/>
@@ -4203,14 +3818,14 @@
       </p:sp>
       <p:sp>
         <p:nvSpPr>
-          <p:cNvPr id="87" name="CustomShape 2"/>
+          <p:cNvPr id="84" name="CustomShape 2"/>
           <p:cNvSpPr/>
           <p:nvPr/>
         </p:nvSpPr>
         <p:spPr>
           <a:xfrm>
             <a:off x="1521720" y="117720"/>
-            <a:ext cx="3971160" cy="513000"/>
+            <a:ext cx="3970800" cy="512640"/>
           </a:xfrm>
           <a:custGeom>
             <a:avLst/>
@@ -4254,14 +3869,14 @@
       </p:sp>
       <p:sp>
         <p:nvSpPr>
-          <p:cNvPr id="88" name="CustomShape 3"/>
+          <p:cNvPr id="85" name="CustomShape 3"/>
           <p:cNvSpPr/>
           <p:nvPr/>
         </p:nvSpPr>
         <p:spPr>
           <a:xfrm>
             <a:off x="1521720" y="314280"/>
-            <a:ext cx="6767280" cy="543240"/>
+            <a:ext cx="6766920" cy="542880"/>
           </a:xfrm>
           <a:custGeom>
             <a:avLst/>
@@ -4314,14 +3929,14 @@
       </p:sp>
       <p:sp>
         <p:nvSpPr>
-          <p:cNvPr id="89" name="CustomShape 4"/>
+          <p:cNvPr id="86" name="CustomShape 4"/>
           <p:cNvSpPr/>
           <p:nvPr/>
         </p:nvSpPr>
         <p:spPr>
           <a:xfrm>
             <a:off x="8293320" y="205200"/>
-            <a:ext cx="142560" cy="191520"/>
+            <a:ext cx="142200" cy="191160"/>
           </a:xfrm>
           <a:prstGeom prst="ellipse">
             <a:avLst/>
@@ -4342,14 +3957,14 @@
       </p:sp>
       <p:sp>
         <p:nvSpPr>
-          <p:cNvPr id="90" name="CustomShape 5"/>
+          <p:cNvPr id="87" name="CustomShape 5"/>
           <p:cNvSpPr/>
           <p:nvPr/>
         </p:nvSpPr>
         <p:spPr>
           <a:xfrm>
             <a:off x="5423760" y="523080"/>
-            <a:ext cx="142560" cy="191520"/>
+            <a:ext cx="142200" cy="191160"/>
           </a:xfrm>
           <a:prstGeom prst="ellipse">
             <a:avLst/>
@@ -4370,14 +3985,14 @@
       </p:sp>
       <p:sp>
         <p:nvSpPr>
-          <p:cNvPr id="91" name="CustomShape 6"/>
+          <p:cNvPr id="88" name="CustomShape 6"/>
           <p:cNvSpPr/>
           <p:nvPr/>
         </p:nvSpPr>
         <p:spPr>
           <a:xfrm>
             <a:off x="7806240" y="6567480"/>
-            <a:ext cx="2851200" cy="180720"/>
+            <a:ext cx="2850840" cy="180360"/>
           </a:xfrm>
           <a:custGeom>
             <a:avLst/>
@@ -4418,14 +4033,14 @@
       </p:sp>
       <p:sp>
         <p:nvSpPr>
-          <p:cNvPr id="92" name="CustomShape 7"/>
+          <p:cNvPr id="89" name="CustomShape 7"/>
           <p:cNvSpPr/>
           <p:nvPr/>
         </p:nvSpPr>
         <p:spPr>
           <a:xfrm>
             <a:off x="5129640" y="5752440"/>
-            <a:ext cx="5527800" cy="646200"/>
+            <a:ext cx="5527440" cy="645840"/>
           </a:xfrm>
           <a:custGeom>
             <a:avLst/>
@@ -4469,14 +4084,14 @@
       </p:sp>
       <p:sp>
         <p:nvSpPr>
-          <p:cNvPr id="93" name="CustomShape 8"/>
+          <p:cNvPr id="90" name="CustomShape 8"/>
           <p:cNvSpPr/>
           <p:nvPr/>
         </p:nvSpPr>
         <p:spPr>
           <a:xfrm>
             <a:off x="4962240" y="6285600"/>
-            <a:ext cx="159120" cy="213480"/>
+            <a:ext cx="158760" cy="213120"/>
           </a:xfrm>
           <a:prstGeom prst="ellipse">
             <a:avLst/>
@@ -4497,14 +4112,14 @@
       </p:sp>
       <p:sp>
         <p:nvSpPr>
-          <p:cNvPr id="94" name="CustomShape 9"/>
+          <p:cNvPr id="91" name="CustomShape 9"/>
           <p:cNvSpPr/>
           <p:nvPr/>
         </p:nvSpPr>
         <p:spPr>
           <a:xfrm>
             <a:off x="7718760" y="6471000"/>
-            <a:ext cx="159120" cy="213480"/>
+            <a:ext cx="158760" cy="213120"/>
           </a:xfrm>
           <a:prstGeom prst="ellipse">
             <a:avLst/>
@@ -4525,14 +4140,14 @@
       </p:sp>
       <p:sp>
         <p:nvSpPr>
-          <p:cNvPr id="95" name="CustomShape 10"/>
+          <p:cNvPr id="92" name="CustomShape 10"/>
           <p:cNvSpPr/>
           <p:nvPr/>
         </p:nvSpPr>
         <p:spPr>
           <a:xfrm>
             <a:off x="1983960" y="1602720"/>
-            <a:ext cx="8224200" cy="2950920"/>
+            <a:ext cx="8223840" cy="2950560"/>
           </a:xfrm>
           <a:prstGeom prst="rect">
             <a:avLst/>
@@ -4679,14 +4294,14 @@
       </p:grpSpPr>
       <p:sp>
         <p:nvSpPr>
-          <p:cNvPr id="96" name="CustomShape 1"/>
+          <p:cNvPr id="93" name="CustomShape 1"/>
           <p:cNvSpPr/>
           <p:nvPr/>
         </p:nvSpPr>
         <p:spPr>
           <a:xfrm>
             <a:off x="2054880" y="961920"/>
-            <a:ext cx="8289360" cy="4501440"/>
+            <a:ext cx="8289000" cy="4501080"/>
           </a:xfrm>
           <a:prstGeom prst="rect">
             <a:avLst/>
@@ -4707,14 +4322,14 @@
       </p:sp>
       <p:sp>
         <p:nvSpPr>
-          <p:cNvPr id="97" name="CustomShape 2"/>
+          <p:cNvPr id="94" name="CustomShape 2"/>
           <p:cNvSpPr/>
           <p:nvPr/>
         </p:nvSpPr>
         <p:spPr>
           <a:xfrm>
             <a:off x="2254680" y="1197000"/>
-            <a:ext cx="7045200" cy="1069560"/>
+            <a:ext cx="7044840" cy="1069200"/>
           </a:xfrm>
           <a:prstGeom prst="rect">
             <a:avLst/>
@@ -4823,7 +4438,7 @@
       </p:sp>
       <p:pic>
         <p:nvPicPr>
-          <p:cNvPr id="98" name="Google Shape;155;p2" descr=""/>
+          <p:cNvPr id="95" name="Google Shape;155;p2" descr=""/>
           <p:cNvPicPr/>
           <p:nvPr/>
         </p:nvPicPr>
@@ -4834,7 +4449,7 @@
         <p:spPr>
           <a:xfrm>
             <a:off x="5050800" y="6087600"/>
-            <a:ext cx="1825920" cy="441360"/>
+            <a:ext cx="1825560" cy="441000"/>
           </a:xfrm>
           <a:prstGeom prst="rect">
             <a:avLst/>
@@ -4876,14 +4491,14 @@
       </p:grpSpPr>
       <p:sp>
         <p:nvSpPr>
-          <p:cNvPr id="99" name="CustomShape 1"/>
+          <p:cNvPr id="96" name="CustomShape 1"/>
           <p:cNvSpPr/>
           <p:nvPr/>
         </p:nvSpPr>
         <p:spPr>
           <a:xfrm>
             <a:off x="2214720" y="1178280"/>
-            <a:ext cx="8289360" cy="4501440"/>
+            <a:ext cx="8289000" cy="4501080"/>
           </a:xfrm>
           <a:prstGeom prst="rect">
             <a:avLst/>
@@ -4904,14 +4519,14 @@
       </p:sp>
       <p:sp>
         <p:nvSpPr>
-          <p:cNvPr id="100" name="CustomShape 2"/>
+          <p:cNvPr id="97" name="CustomShape 2"/>
           <p:cNvSpPr/>
           <p:nvPr/>
         </p:nvSpPr>
         <p:spPr>
           <a:xfrm>
             <a:off x="2363400" y="1402920"/>
-            <a:ext cx="7045200" cy="1069560"/>
+            <a:ext cx="7044840" cy="1069200"/>
           </a:xfrm>
           <a:prstGeom prst="rect">
             <a:avLst/>
@@ -5020,7 +4635,7 @@
       </p:sp>
       <p:pic>
         <p:nvPicPr>
-          <p:cNvPr id="101" name="Google Shape;162;p3" descr=""/>
+          <p:cNvPr id="98" name="Google Shape;162;p3" descr=""/>
           <p:cNvPicPr/>
           <p:nvPr/>
         </p:nvPicPr>
@@ -5031,7 +4646,7 @@
         <p:spPr>
           <a:xfrm>
             <a:off x="5050800" y="6087600"/>
-            <a:ext cx="1825920" cy="441360"/>
+            <a:ext cx="1825560" cy="441000"/>
           </a:xfrm>
           <a:prstGeom prst="rect">
             <a:avLst/>
@@ -5073,14 +4688,14 @@
       </p:grpSpPr>
       <p:sp>
         <p:nvSpPr>
-          <p:cNvPr id="102" name="CustomShape 1"/>
+          <p:cNvPr id="99" name="CustomShape 1"/>
           <p:cNvSpPr/>
           <p:nvPr/>
         </p:nvSpPr>
         <p:spPr>
           <a:xfrm>
             <a:off x="1751760" y="495720"/>
-            <a:ext cx="8752320" cy="5184000"/>
+            <a:ext cx="8751960" cy="5183640"/>
           </a:xfrm>
           <a:prstGeom prst="rect">
             <a:avLst/>
@@ -5101,14 +4716,14 @@
       </p:sp>
       <p:sp>
         <p:nvSpPr>
-          <p:cNvPr id="103" name="CustomShape 2"/>
+          <p:cNvPr id="100" name="CustomShape 2"/>
           <p:cNvSpPr/>
           <p:nvPr/>
         </p:nvSpPr>
         <p:spPr>
           <a:xfrm>
             <a:off x="2363400" y="1402920"/>
-            <a:ext cx="7045200" cy="1069560"/>
+            <a:ext cx="7044840" cy="1069200"/>
           </a:xfrm>
           <a:prstGeom prst="rect">
             <a:avLst/>
@@ -5171,7 +4786,7 @@
       </p:sp>
       <p:pic>
         <p:nvPicPr>
-          <p:cNvPr id="104" name="Google Shape;169;g126a841be86_0_5" descr=""/>
+          <p:cNvPr id="101" name="Google Shape;169;g126a841be86_0_5" descr=""/>
           <p:cNvPicPr/>
           <p:nvPr/>
         </p:nvPicPr>
@@ -5182,7 +4797,7 @@
         <p:spPr>
           <a:xfrm>
             <a:off x="5050800" y="6087600"/>
-            <a:ext cx="1825920" cy="441360"/>
+            <a:ext cx="1825560" cy="441000"/>
           </a:xfrm>
           <a:prstGeom prst="rect">
             <a:avLst/>
@@ -5194,14 +4809,14 @@
       </p:pic>
       <p:sp>
         <p:nvSpPr>
-          <p:cNvPr id="105" name="CustomShape 3"/>
+          <p:cNvPr id="102" name="CustomShape 3"/>
           <p:cNvSpPr/>
           <p:nvPr/>
         </p:nvSpPr>
         <p:spPr>
           <a:xfrm>
             <a:off x="1983960" y="1602720"/>
-            <a:ext cx="8224200" cy="3701520"/>
+            <a:ext cx="8223840" cy="3701160"/>
           </a:xfrm>
           <a:prstGeom prst="rect">
             <a:avLst/>
@@ -5245,7 +4860,7 @@
             </a:endParaRPr>
           </a:p>
           <a:p>
-            <a:pPr marL="457200" indent="-458640">
+            <a:pPr marL="457200" indent="-458280">
               <a:lnSpc>
                 <a:spcPct val="100000"/>
               </a:lnSpc>
@@ -5273,7 +4888,7 @@
             </a:endParaRPr>
           </a:p>
           <a:p>
-            <a:pPr marL="457200" indent="-458640">
+            <a:pPr marL="457200" indent="-458280">
               <a:lnSpc>
                 <a:spcPct val="100000"/>
               </a:lnSpc>
@@ -5301,7 +4916,7 @@
             </a:endParaRPr>
           </a:p>
           <a:p>
-            <a:pPr marL="457200" indent="-458640">
+            <a:pPr marL="457200" indent="-458280">
               <a:lnSpc>
                 <a:spcPct val="100000"/>
               </a:lnSpc>
@@ -5329,7 +4944,7 @@
             </a:endParaRPr>
           </a:p>
           <a:p>
-            <a:pPr marL="457200" indent="-458640">
+            <a:pPr marL="457200" indent="-458280">
               <a:lnSpc>
                 <a:spcPct val="100000"/>
               </a:lnSpc>
@@ -5429,14 +5044,14 @@
       </p:grpSpPr>
       <p:sp>
         <p:nvSpPr>
-          <p:cNvPr id="106" name="CustomShape 1"/>
+          <p:cNvPr id="103" name="CustomShape 1"/>
           <p:cNvSpPr/>
           <p:nvPr/>
         </p:nvSpPr>
         <p:spPr>
           <a:xfrm>
             <a:off x="2065680" y="770400"/>
-            <a:ext cx="8289360" cy="4725000"/>
+            <a:ext cx="8289000" cy="4724640"/>
           </a:xfrm>
           <a:prstGeom prst="rect">
             <a:avLst/>
@@ -5457,14 +5072,14 @@
       </p:sp>
       <p:sp>
         <p:nvSpPr>
-          <p:cNvPr id="107" name="CustomShape 2"/>
+          <p:cNvPr id="104" name="CustomShape 2"/>
           <p:cNvSpPr/>
           <p:nvPr/>
         </p:nvSpPr>
         <p:spPr>
           <a:xfrm>
             <a:off x="2236320" y="1265040"/>
-            <a:ext cx="7045200" cy="1069560"/>
+            <a:ext cx="7044840" cy="1069200"/>
           </a:xfrm>
           <a:prstGeom prst="rect">
             <a:avLst/>
@@ -5494,7 +5109,7 @@
               </a:tabLst>
             </a:pPr>
             <a:r>
-              <a:rPr b="1" lang="en-US" sz="3270" spc="-1" strike="noStrike">
+              <a:rPr b="1" lang="en-US" sz="2800" spc="-1" strike="noStrike">
                 <a:solidFill>
                   <a:srgbClr val="ffffff"/>
                 </a:solidFill>
@@ -5503,7 +5118,7 @@
               </a:rPr>
               <a:t>Any supporting assumptions, functional requirements(FR) and non-functional requirements(NFR)</a:t>
             </a:r>
-            <a:endParaRPr b="0" lang="en-IN" sz="3270" spc="-1" strike="noStrike">
+            <a:endParaRPr b="0" lang="en-IN" sz="2800" spc="-1" strike="noStrike">
               <a:latin typeface="Arial"/>
             </a:endParaRPr>
           </a:p>
@@ -5516,7 +5131,7 @@
                 <a:tab algn="l" pos="0"/>
               </a:tabLst>
             </a:pPr>
-            <a:endParaRPr b="0" lang="en-IN" sz="3270" spc="-1" strike="noStrike">
+            <a:endParaRPr b="0" lang="en-IN" sz="2800" spc="-1" strike="noStrike">
               <a:latin typeface="Arial"/>
             </a:endParaRPr>
           </a:p>
@@ -5530,7 +5145,7 @@
               </a:tabLst>
             </a:pPr>
             <a:r>
-              <a:rPr b="1" lang="en-US" sz="3270" spc="-1" strike="noStrike">
+              <a:rPr b="1" lang="en-US" sz="2800" spc="-1" strike="noStrike">
                 <a:solidFill>
                   <a:srgbClr val="ffffff"/>
                 </a:solidFill>
@@ -5539,7 +5154,7 @@
               </a:rPr>
               <a:t>This is only simple compression provided by H265 codec. We can explore more options around latest available codecs / strategies. </a:t>
             </a:r>
-            <a:endParaRPr b="0" lang="en-IN" sz="3270" spc="-1" strike="noStrike">
+            <a:endParaRPr b="0" lang="en-IN" sz="2800" spc="-1" strike="noStrike">
               <a:latin typeface="Arial"/>
             </a:endParaRPr>
           </a:p>
@@ -5552,7 +5167,7 @@
                 <a:tab algn="l" pos="0"/>
               </a:tabLst>
             </a:pPr>
-            <a:endParaRPr b="0" lang="en-IN" sz="3270" spc="-1" strike="noStrike">
+            <a:endParaRPr b="0" lang="en-IN" sz="2800" spc="-1" strike="noStrike">
               <a:latin typeface="Arial"/>
             </a:endParaRPr>
           </a:p>
@@ -5565,7 +5180,7 @@
                 <a:tab algn="l" pos="0"/>
               </a:tabLst>
             </a:pPr>
-            <a:endParaRPr b="0" lang="en-IN" sz="3270" spc="-1" strike="noStrike">
+            <a:endParaRPr b="0" lang="en-IN" sz="2800" spc="-1" strike="noStrike">
               <a:latin typeface="Arial"/>
             </a:endParaRPr>
           </a:p>
@@ -5573,7 +5188,7 @@
       </p:sp>
       <p:pic>
         <p:nvPicPr>
-          <p:cNvPr id="108" name="Google Shape;177;p4" descr=""/>
+          <p:cNvPr id="105" name="Google Shape;177;p4" descr=""/>
           <p:cNvPicPr/>
           <p:nvPr/>
         </p:nvPicPr>
@@ -5584,7 +5199,7 @@
         <p:spPr>
           <a:xfrm>
             <a:off x="5050800" y="6152760"/>
-            <a:ext cx="1825920" cy="441360"/>
+            <a:ext cx="1825560" cy="441000"/>
           </a:xfrm>
           <a:prstGeom prst="rect">
             <a:avLst/>
@@ -5626,14 +5241,14 @@
       </p:grpSpPr>
       <p:sp>
         <p:nvSpPr>
-          <p:cNvPr id="109" name="CustomShape 1"/>
+          <p:cNvPr id="106" name="CustomShape 1"/>
           <p:cNvSpPr/>
           <p:nvPr/>
         </p:nvSpPr>
         <p:spPr>
           <a:xfrm>
             <a:off x="1951200" y="1222560"/>
-            <a:ext cx="8289360" cy="4501440"/>
+            <a:ext cx="8289000" cy="4501080"/>
           </a:xfrm>
           <a:prstGeom prst="rect">
             <a:avLst/>
@@ -5654,14 +5269,14 @@
       </p:sp>
       <p:sp>
         <p:nvSpPr>
-          <p:cNvPr id="110" name="CustomShape 2"/>
+          <p:cNvPr id="107" name="CustomShape 2"/>
           <p:cNvSpPr/>
           <p:nvPr/>
         </p:nvSpPr>
         <p:spPr>
           <a:xfrm>
             <a:off x="2160000" y="1605240"/>
-            <a:ext cx="7045200" cy="1069560"/>
+            <a:ext cx="7044840" cy="1069200"/>
           </a:xfrm>
           <a:prstGeom prst="rect">
             <a:avLst/>
@@ -5691,7 +5306,7 @@
               </a:tabLst>
             </a:pPr>
             <a:r>
-              <a:rPr b="1" lang="en-US" sz="3270" spc="-1" strike="noStrike">
+              <a:rPr b="1" lang="en-US" sz="2800" spc="-1" strike="noStrike">
                 <a:solidFill>
                   <a:srgbClr val="ffffff"/>
                 </a:solidFill>
@@ -5700,22 +5315,58 @@
               </a:rPr>
               <a:t>reason why your solution should be considered</a:t>
             </a:r>
-            <a:endParaRPr b="0" lang="en-IN" sz="3270" spc="-1" strike="noStrike">
-              <a:latin typeface="Arial"/>
-            </a:endParaRPr>
-          </a:p>
-        </p:txBody>
-      </p:sp>
-      <p:sp>
-        <p:nvSpPr>
-          <p:cNvPr id="111" name="CustomShape 3"/>
+            <a:endParaRPr b="0" lang="en-IN" sz="2800" spc="-1" strike="noStrike">
+              <a:latin typeface="Arial"/>
+            </a:endParaRPr>
+          </a:p>
+          <a:p>
+            <a:pPr>
+              <a:lnSpc>
+                <a:spcPct val="100000"/>
+              </a:lnSpc>
+              <a:tabLst>
+                <a:tab algn="l" pos="0"/>
+              </a:tabLst>
+            </a:pPr>
+            <a:endParaRPr b="0" lang="en-IN" sz="2800" spc="-1" strike="noStrike">
+              <a:latin typeface="Arial"/>
+            </a:endParaRPr>
+          </a:p>
+          <a:p>
+            <a:pPr>
+              <a:lnSpc>
+                <a:spcPct val="100000"/>
+              </a:lnSpc>
+              <a:tabLst>
+                <a:tab algn="l" pos="0"/>
+              </a:tabLst>
+            </a:pPr>
+            <a:r>
+              <a:rPr b="1" lang="en-US" sz="2400" spc="-1" strike="noStrike">
+                <a:solidFill>
+                  <a:srgbClr val="ffffff"/>
+                </a:solidFill>
+                <a:latin typeface="Arial"/>
+                <a:ea typeface="Arial"/>
+              </a:rPr>
+              <a:t>It brings together tooling needed to read the videos and do compression before transmission. This can be improvised further to optimize video processing pipeline. We feel the pipeline may take into account the type of processing we do to the video. We will get to this in the next stage. </a:t>
+            </a:r>
+            <a:endParaRPr b="0" lang="en-IN" sz="2400" spc="-1" strike="noStrike">
+              <a:latin typeface="Arial"/>
+            </a:endParaRPr>
+          </a:p>
+        </p:txBody>
+      </p:sp>
+      <p:sp>
+        <p:nvSpPr>
+          <p:cNvPr id="108" name="CustomShape 3"/>
           <p:cNvSpPr/>
           <p:nvPr/>
         </p:nvSpPr>
         <p:spPr>
           <a:xfrm>
             <a:off x="3180240" y="2117520"/>
-            <a:ext cx="3347640" cy="297000"/>
+            <a:ext cx="3347280" cy="296640"/>
           </a:xfrm>
           <a:prstGeom prst="rect">
             <a:avLst/>
@@ -5734,14 +5385,14 @@
       </p:sp>
       <p:sp>
         <p:nvSpPr>
-          <p:cNvPr id="112" name="CustomShape 4"/>
+          <p:cNvPr id="109" name="CustomShape 4"/>
           <p:cNvSpPr/>
           <p:nvPr/>
         </p:nvSpPr>
         <p:spPr>
           <a:xfrm>
             <a:off x="3180240" y="2441160"/>
-            <a:ext cx="6241320" cy="407520"/>
+            <a:ext cx="6240960" cy="407160"/>
           </a:xfrm>
           <a:prstGeom prst="rect">
             <a:avLst/>
@@ -5760,14 +5411,14 @@
       </p:sp>
       <p:sp>
         <p:nvSpPr>
-          <p:cNvPr id="113" name="CustomShape 5"/>
+          <p:cNvPr id="110" name="CustomShape 5"/>
           <p:cNvSpPr/>
           <p:nvPr/>
         </p:nvSpPr>
         <p:spPr>
           <a:xfrm>
             <a:off x="3137040" y="4040640"/>
-            <a:ext cx="5820120" cy="407520"/>
+            <a:ext cx="5819760" cy="407160"/>
           </a:xfrm>
           <a:prstGeom prst="rect">
             <a:avLst/>
@@ -5786,14 +5437,14 @@
       </p:sp>
       <p:sp>
         <p:nvSpPr>
-          <p:cNvPr id="114" name="CustomShape 6"/>
+          <p:cNvPr id="111" name="CustomShape 6"/>
           <p:cNvSpPr/>
           <p:nvPr/>
         </p:nvSpPr>
         <p:spPr>
           <a:xfrm>
             <a:off x="2428560" y="2089800"/>
-            <a:ext cx="986040" cy="585000"/>
+            <a:ext cx="985680" cy="584640"/>
           </a:xfrm>
           <a:prstGeom prst="rect">
             <a:avLst/>
@@ -5812,14 +5463,14 @@
       </p:sp>
       <p:sp>
         <p:nvSpPr>
-          <p:cNvPr id="115" name="CustomShape 7"/>
+          <p:cNvPr id="112" name="CustomShape 7"/>
           <p:cNvSpPr/>
           <p:nvPr/>
         </p:nvSpPr>
         <p:spPr>
           <a:xfrm>
             <a:off x="2428560" y="3690360"/>
-            <a:ext cx="705240" cy="486720"/>
+            <a:ext cx="704880" cy="486360"/>
           </a:xfrm>
           <a:prstGeom prst="rect">
             <a:avLst/>
@@ -5838,14 +5489,14 @@
       </p:sp>
       <p:sp>
         <p:nvSpPr>
-          <p:cNvPr id="116" name="CustomShape 8"/>
+          <p:cNvPr id="113" name="CustomShape 8"/>
           <p:cNvSpPr/>
           <p:nvPr/>
         </p:nvSpPr>
         <p:spPr>
           <a:xfrm>
             <a:off x="3180240" y="2441160"/>
-            <a:ext cx="6241320" cy="407520"/>
+            <a:ext cx="6240960" cy="407160"/>
           </a:xfrm>
           <a:prstGeom prst="rect">
             <a:avLst/>
@@ -5864,14 +5515,14 @@
       </p:sp>
       <p:sp>
         <p:nvSpPr>
-          <p:cNvPr id="117" name="CustomShape 9"/>
+          <p:cNvPr id="114" name="CustomShape 9"/>
           <p:cNvSpPr/>
           <p:nvPr/>
         </p:nvSpPr>
         <p:spPr>
           <a:xfrm>
             <a:off x="3180240" y="2117520"/>
-            <a:ext cx="3347640" cy="297000"/>
+            <a:ext cx="3347280" cy="296640"/>
           </a:xfrm>
           <a:prstGeom prst="rect">
             <a:avLst/>
@@ -5890,14 +5541,14 @@
       </p:sp>
       <p:sp>
         <p:nvSpPr>
-          <p:cNvPr id="118" name="CustomShape 10"/>
+          <p:cNvPr id="115" name="CustomShape 10"/>
           <p:cNvSpPr/>
           <p:nvPr/>
         </p:nvSpPr>
         <p:spPr>
           <a:xfrm>
             <a:off x="3180240" y="2117520"/>
-            <a:ext cx="3347640" cy="297000"/>
+            <a:ext cx="3347280" cy="296640"/>
           </a:xfrm>
           <a:prstGeom prst="rect">
             <a:avLst/>
@@ -5916,14 +5567,14 @@
       </p:sp>
       <p:sp>
         <p:nvSpPr>
-          <p:cNvPr id="119" name="CustomShape 11"/>
+          <p:cNvPr id="116" name="CustomShape 11"/>
           <p:cNvSpPr/>
           <p:nvPr/>
         </p:nvSpPr>
         <p:spPr>
           <a:xfrm>
             <a:off x="3194280" y="3722760"/>
-            <a:ext cx="3347640" cy="297000"/>
+            <a:ext cx="3347280" cy="296640"/>
           </a:xfrm>
           <a:prstGeom prst="rect">
             <a:avLst/>
@@ -5942,7 +5593,7 @@
       </p:sp>
       <p:pic>
         <p:nvPicPr>
-          <p:cNvPr id="120" name="Google Shape;193;p6" descr=""/>
+          <p:cNvPr id="117" name="Google Shape;193;p6" descr=""/>
           <p:cNvPicPr/>
           <p:nvPr/>
         </p:nvPicPr>
@@ -5953,7 +5604,7 @@
         <p:spPr>
           <a:xfrm>
             <a:off x="5050800" y="6152760"/>
-            <a:ext cx="1825920" cy="441360"/>
+            <a:ext cx="1825560" cy="441000"/>
           </a:xfrm>
           <a:prstGeom prst="rect">
             <a:avLst/>
@@ -5995,14 +5646,14 @@
       </p:grpSpPr>
       <p:sp>
         <p:nvSpPr>
-          <p:cNvPr id="121" name="CustomShape 1"/>
+          <p:cNvPr id="118" name="CustomShape 1"/>
           <p:cNvSpPr/>
           <p:nvPr/>
         </p:nvSpPr>
         <p:spPr>
           <a:xfrm>
             <a:off x="1983600" y="954000"/>
-            <a:ext cx="8289360" cy="4501440"/>
+            <a:ext cx="8289000" cy="4501080"/>
           </a:xfrm>
           <a:prstGeom prst="rect">
             <a:avLst/>
@@ -6023,14 +5674,14 @@
       </p:sp>
       <p:sp>
         <p:nvSpPr>
-          <p:cNvPr id="122" name="CustomShape 2"/>
+          <p:cNvPr id="119" name="CustomShape 2"/>
           <p:cNvSpPr/>
           <p:nvPr/>
         </p:nvSpPr>
         <p:spPr>
           <a:xfrm>
             <a:off x="2078640" y="1175400"/>
-            <a:ext cx="8034120" cy="1069560"/>
+            <a:ext cx="8033760" cy="1069200"/>
           </a:xfrm>
           <a:prstGeom prst="rect">
             <a:avLst/>
@@ -6155,7 +5806,7 @@
       </p:sp>
       <p:pic>
         <p:nvPicPr>
-          <p:cNvPr id="123" name="Google Shape;200;p7" descr=""/>
+          <p:cNvPr id="120" name="Google Shape;200;p7" descr=""/>
           <p:cNvPicPr/>
           <p:nvPr/>
         </p:nvPicPr>
@@ -6166,7 +5817,7 @@
         <p:spPr>
           <a:xfrm>
             <a:off x="5050800" y="6152760"/>
-            <a:ext cx="1825920" cy="441360"/>
+            <a:ext cx="1825560" cy="441000"/>
           </a:xfrm>
           <a:prstGeom prst="rect">
             <a:avLst/>
@@ -6208,14 +5859,14 @@
       </p:grpSpPr>
       <p:sp>
         <p:nvSpPr>
-          <p:cNvPr id="124" name="CustomShape 1"/>
+          <p:cNvPr id="121" name="CustomShape 1"/>
           <p:cNvSpPr/>
           <p:nvPr/>
         </p:nvSpPr>
         <p:spPr>
           <a:xfrm>
             <a:off x="1983600" y="954000"/>
-            <a:ext cx="8289360" cy="4501440"/>
+            <a:ext cx="8289000" cy="4501080"/>
           </a:xfrm>
           <a:prstGeom prst="rect">
             <a:avLst/>
@@ -6236,14 +5887,14 @@
       </p:sp>
       <p:sp>
         <p:nvSpPr>
-          <p:cNvPr id="125" name="CustomShape 2"/>
+          <p:cNvPr id="122" name="CustomShape 2"/>
           <p:cNvSpPr/>
           <p:nvPr/>
         </p:nvSpPr>
         <p:spPr>
           <a:xfrm>
             <a:off x="2078640" y="1175400"/>
-            <a:ext cx="8034480" cy="1815120"/>
+            <a:ext cx="8034120" cy="1814760"/>
           </a:xfrm>
           <a:prstGeom prst="rect">
             <a:avLst/>
@@ -6502,7 +6153,7 @@
       </p:sp>
       <p:pic>
         <p:nvPicPr>
-          <p:cNvPr id="126" name="Google Shape;207;p8" descr=""/>
+          <p:cNvPr id="123" name="Google Shape;207;p8" descr=""/>
           <p:cNvPicPr/>
           <p:nvPr/>
         </p:nvPicPr>
@@ -6513,7 +6164,7 @@
         <p:spPr>
           <a:xfrm>
             <a:off x="5050800" y="6152760"/>
-            <a:ext cx="1825920" cy="441360"/>
+            <a:ext cx="1825560" cy="441000"/>
           </a:xfrm>
           <a:prstGeom prst="rect">
             <a:avLst/>
@@ -6555,14 +6206,14 @@
       </p:grpSpPr>
       <p:sp>
         <p:nvSpPr>
-          <p:cNvPr id="127" name="CustomShape 1"/>
+          <p:cNvPr id="124" name="CustomShape 1"/>
           <p:cNvSpPr/>
           <p:nvPr/>
         </p:nvSpPr>
         <p:spPr>
           <a:xfrm>
             <a:off x="2111040" y="690840"/>
-            <a:ext cx="8289360" cy="4501440"/>
+            <a:ext cx="8289000" cy="4501080"/>
           </a:xfrm>
           <a:prstGeom prst="rect">
             <a:avLst/>
@@ -6581,7 +6232,7 @@
           <a:fontRef idx="minor"/>
         </p:style>
         <p:txBody>
-          <a:bodyPr tIns="91440" bIns="91440" anchor="ctr">
+          <a:bodyPr lIns="90000" rIns="90000" tIns="91440" bIns="91440" anchor="ctr">
             <a:noAutofit/>
           </a:bodyPr>
           <a:p>
@@ -6722,14 +6373,14 @@
       </p:sp>
       <p:sp>
         <p:nvSpPr>
-          <p:cNvPr id="128" name="CustomShape 2"/>
+          <p:cNvPr id="125" name="CustomShape 2"/>
           <p:cNvSpPr/>
           <p:nvPr/>
         </p:nvSpPr>
         <p:spPr>
           <a:xfrm>
             <a:off x="2111040" y="819360"/>
-            <a:ext cx="7045200" cy="1069560"/>
+            <a:ext cx="7044840" cy="1069200"/>
           </a:xfrm>
           <a:prstGeom prst="rect">
             <a:avLst/>
@@ -6792,7 +6443,7 @@
       </p:sp>
       <p:pic>
         <p:nvPicPr>
-          <p:cNvPr id="129" name="Google Shape;214;p9" descr=""/>
+          <p:cNvPr id="126" name="Google Shape;214;p9" descr=""/>
           <p:cNvPicPr/>
           <p:nvPr/>
         </p:nvPicPr>
@@ -6803,7 +6454,7 @@
         <p:spPr>
           <a:xfrm>
             <a:off x="2634840" y="1736640"/>
-            <a:ext cx="7539840" cy="1595160"/>
+            <a:ext cx="7539480" cy="1594800"/>
           </a:xfrm>
           <a:prstGeom prst="rect">
             <a:avLst/>
@@ -6815,7 +6466,7 @@
       </p:pic>
       <p:pic>
         <p:nvPicPr>
-          <p:cNvPr id="130" name="Google Shape;215;p9" descr=""/>
+          <p:cNvPr id="127" name="Google Shape;215;p9" descr=""/>
           <p:cNvPicPr/>
           <p:nvPr/>
         </p:nvPicPr>
@@ -6826,7 +6477,7 @@
         <p:spPr>
           <a:xfrm>
             <a:off x="5050800" y="6152760"/>
-            <a:ext cx="1825920" cy="441360"/>
+            <a:ext cx="1825560" cy="441000"/>
           </a:xfrm>
           <a:prstGeom prst="rect">
             <a:avLst/>

</xml_diff>